<commit_message>
Added png word clouds
</commit_message>
<xml_diff>
--- a/images/eda/Presentation1.pptx
+++ b/images/eda/Presentation1.pptx
@@ -273,7 +273,7 @@
           <a:p>
             <a:fld id="{718E323C-DBA5-4272-AACA-840E2D89880F}" type="datetimeFigureOut">
               <a:rPr lang="en-GB" smtClean="0"/>
-              <a:t>03/12/2023</a:t>
+              <a:t>04/12/2023</a:t>
             </a:fld>
             <a:endParaRPr lang="en-GB"/>
           </a:p>
@@ -473,7 +473,7 @@
           <a:p>
             <a:fld id="{718E323C-DBA5-4272-AACA-840E2D89880F}" type="datetimeFigureOut">
               <a:rPr lang="en-GB" smtClean="0"/>
-              <a:t>03/12/2023</a:t>
+              <a:t>04/12/2023</a:t>
             </a:fld>
             <a:endParaRPr lang="en-GB"/>
           </a:p>
@@ -683,7 +683,7 @@
           <a:p>
             <a:fld id="{718E323C-DBA5-4272-AACA-840E2D89880F}" type="datetimeFigureOut">
               <a:rPr lang="en-GB" smtClean="0"/>
-              <a:t>03/12/2023</a:t>
+              <a:t>04/12/2023</a:t>
             </a:fld>
             <a:endParaRPr lang="en-GB"/>
           </a:p>
@@ -883,7 +883,7 @@
           <a:p>
             <a:fld id="{718E323C-DBA5-4272-AACA-840E2D89880F}" type="datetimeFigureOut">
               <a:rPr lang="en-GB" smtClean="0"/>
-              <a:t>03/12/2023</a:t>
+              <a:t>04/12/2023</a:t>
             </a:fld>
             <a:endParaRPr lang="en-GB"/>
           </a:p>
@@ -1159,7 +1159,7 @@
           <a:p>
             <a:fld id="{718E323C-DBA5-4272-AACA-840E2D89880F}" type="datetimeFigureOut">
               <a:rPr lang="en-GB" smtClean="0"/>
-              <a:t>03/12/2023</a:t>
+              <a:t>04/12/2023</a:t>
             </a:fld>
             <a:endParaRPr lang="en-GB"/>
           </a:p>
@@ -1427,7 +1427,7 @@
           <a:p>
             <a:fld id="{718E323C-DBA5-4272-AACA-840E2D89880F}" type="datetimeFigureOut">
               <a:rPr lang="en-GB" smtClean="0"/>
-              <a:t>03/12/2023</a:t>
+              <a:t>04/12/2023</a:t>
             </a:fld>
             <a:endParaRPr lang="en-GB"/>
           </a:p>
@@ -1842,7 +1842,7 @@
           <a:p>
             <a:fld id="{718E323C-DBA5-4272-AACA-840E2D89880F}" type="datetimeFigureOut">
               <a:rPr lang="en-GB" smtClean="0"/>
-              <a:t>03/12/2023</a:t>
+              <a:t>04/12/2023</a:t>
             </a:fld>
             <a:endParaRPr lang="en-GB"/>
           </a:p>
@@ -1984,7 +1984,7 @@
           <a:p>
             <a:fld id="{718E323C-DBA5-4272-AACA-840E2D89880F}" type="datetimeFigureOut">
               <a:rPr lang="en-GB" smtClean="0"/>
-              <a:t>03/12/2023</a:t>
+              <a:t>04/12/2023</a:t>
             </a:fld>
             <a:endParaRPr lang="en-GB"/>
           </a:p>
@@ -2097,7 +2097,7 @@
           <a:p>
             <a:fld id="{718E323C-DBA5-4272-AACA-840E2D89880F}" type="datetimeFigureOut">
               <a:rPr lang="en-GB" smtClean="0"/>
-              <a:t>03/12/2023</a:t>
+              <a:t>04/12/2023</a:t>
             </a:fld>
             <a:endParaRPr lang="en-GB"/>
           </a:p>
@@ -2410,7 +2410,7 @@
           <a:p>
             <a:fld id="{718E323C-DBA5-4272-AACA-840E2D89880F}" type="datetimeFigureOut">
               <a:rPr lang="en-GB" smtClean="0"/>
-              <a:t>03/12/2023</a:t>
+              <a:t>04/12/2023</a:t>
             </a:fld>
             <a:endParaRPr lang="en-GB"/>
           </a:p>
@@ -2699,7 +2699,7 @@
           <a:p>
             <a:fld id="{718E323C-DBA5-4272-AACA-840E2D89880F}" type="datetimeFigureOut">
               <a:rPr lang="en-GB" smtClean="0"/>
-              <a:t>03/12/2023</a:t>
+              <a:t>04/12/2023</a:t>
             </a:fld>
             <a:endParaRPr lang="en-GB"/>
           </a:p>
@@ -2942,7 +2942,7 @@
           <a:p>
             <a:fld id="{718E323C-DBA5-4272-AACA-840E2D89880F}" type="datetimeFigureOut">
               <a:rPr lang="en-GB" smtClean="0"/>
-              <a:t>03/12/2023</a:t>
+              <a:t>04/12/2023</a:t>
             </a:fld>
             <a:endParaRPr lang="en-GB"/>
           </a:p>
@@ -3592,15 +3592,20 @@
           <p:nvPr/>
         </p:nvPicPr>
         <p:blipFill>
-          <a:blip r:embed="rId2"/>
-          <a:stretch>
-            <a:fillRect/>
-          </a:stretch>
+          <a:blip r:embed="rId2">
+            <a:extLst>
+              <a:ext uri="{28A0092B-C50C-407E-A947-70E740481C1C}">
+                <a14:useLocalDpi xmlns:a14="http://schemas.microsoft.com/office/drawing/2010/main" val="0"/>
+              </a:ext>
+            </a:extLst>
+          </a:blip>
+          <a:srcRect/>
+          <a:stretch/>
         </p:blipFill>
         <p:spPr>
           <a:xfrm>
-            <a:off x="968400" y="1634400"/>
-            <a:ext cx="3278292" cy="1671928"/>
+            <a:off x="969249" y="1634400"/>
+            <a:ext cx="3276594" cy="1671928"/>
           </a:xfrm>
           <a:prstGeom prst="rect">
             <a:avLst/>
@@ -3622,15 +3627,20 @@
           <p:nvPr/>
         </p:nvPicPr>
         <p:blipFill>
-          <a:blip r:embed="rId3"/>
-          <a:stretch>
-            <a:fillRect/>
-          </a:stretch>
+          <a:blip r:embed="rId3">
+            <a:extLst>
+              <a:ext uri="{28A0092B-C50C-407E-A947-70E740481C1C}">
+                <a14:useLocalDpi xmlns:a14="http://schemas.microsoft.com/office/drawing/2010/main" val="0"/>
+              </a:ext>
+            </a:extLst>
+          </a:blip>
+          <a:srcRect/>
+          <a:stretch/>
         </p:blipFill>
         <p:spPr>
           <a:xfrm>
-            <a:off x="4370400" y="1634400"/>
-            <a:ext cx="3247059" cy="1656000"/>
+            <a:off x="4370400" y="1636476"/>
+            <a:ext cx="3247059" cy="1651847"/>
           </a:xfrm>
           <a:prstGeom prst="rect">
             <a:avLst/>
@@ -3652,15 +3662,20 @@
           <p:nvPr/>
         </p:nvPicPr>
         <p:blipFill>
-          <a:blip r:embed="rId4"/>
-          <a:stretch>
-            <a:fillRect/>
-          </a:stretch>
+          <a:blip r:embed="rId4">
+            <a:extLst>
+              <a:ext uri="{28A0092B-C50C-407E-A947-70E740481C1C}">
+                <a14:useLocalDpi xmlns:a14="http://schemas.microsoft.com/office/drawing/2010/main" val="0"/>
+              </a:ext>
+            </a:extLst>
+          </a:blip>
+          <a:srcRect/>
+          <a:stretch/>
         </p:blipFill>
         <p:spPr>
           <a:xfrm>
-            <a:off x="7741167" y="1634400"/>
-            <a:ext cx="3247061" cy="1656000"/>
+            <a:off x="7742008" y="1634400"/>
+            <a:ext cx="3245379" cy="1656000"/>
           </a:xfrm>
           <a:prstGeom prst="rect">
             <a:avLst/>
@@ -3682,15 +3697,20 @@
           <p:nvPr/>
         </p:nvPicPr>
         <p:blipFill>
-          <a:blip r:embed="rId5"/>
-          <a:stretch>
-            <a:fillRect/>
-          </a:stretch>
+          <a:blip r:embed="rId5">
+            <a:extLst>
+              <a:ext uri="{28A0092B-C50C-407E-A947-70E740481C1C}">
+                <a14:useLocalDpi xmlns:a14="http://schemas.microsoft.com/office/drawing/2010/main" val="0"/>
+              </a:ext>
+            </a:extLst>
+          </a:blip>
+          <a:srcRect/>
+          <a:stretch/>
         </p:blipFill>
         <p:spPr>
           <a:xfrm>
-            <a:off x="968400" y="3290400"/>
-            <a:ext cx="3278292" cy="1671928"/>
+            <a:off x="968400" y="3294774"/>
+            <a:ext cx="3278292" cy="1663180"/>
           </a:xfrm>
           <a:prstGeom prst="rect">
             <a:avLst/>
@@ -3712,15 +3732,20 @@
           <p:nvPr/>
         </p:nvPicPr>
         <p:blipFill>
-          <a:blip r:embed="rId6"/>
-          <a:stretch>
-            <a:fillRect/>
-          </a:stretch>
+          <a:blip r:embed="rId6">
+            <a:extLst>
+              <a:ext uri="{28A0092B-C50C-407E-A947-70E740481C1C}">
+                <a14:useLocalDpi xmlns:a14="http://schemas.microsoft.com/office/drawing/2010/main" val="0"/>
+              </a:ext>
+            </a:extLst>
+          </a:blip>
+          <a:srcRect/>
+          <a:stretch/>
         </p:blipFill>
         <p:spPr>
           <a:xfrm>
-            <a:off x="4370400" y="3306328"/>
-            <a:ext cx="3247059" cy="1656000"/>
+            <a:off x="4375566" y="3306328"/>
+            <a:ext cx="3236726" cy="1656000"/>
           </a:xfrm>
           <a:prstGeom prst="rect">
             <a:avLst/>
@@ -3742,15 +3767,20 @@
           <p:nvPr/>
         </p:nvPicPr>
         <p:blipFill>
-          <a:blip r:embed="rId7"/>
-          <a:stretch>
-            <a:fillRect/>
-          </a:stretch>
+          <a:blip r:embed="rId7">
+            <a:extLst>
+              <a:ext uri="{28A0092B-C50C-407E-A947-70E740481C1C}">
+                <a14:useLocalDpi xmlns:a14="http://schemas.microsoft.com/office/drawing/2010/main" val="0"/>
+              </a:ext>
+            </a:extLst>
+          </a:blip>
+          <a:srcRect/>
+          <a:stretch/>
         </p:blipFill>
         <p:spPr>
           <a:xfrm>
-            <a:off x="7741166" y="3306328"/>
-            <a:ext cx="3247061" cy="1656000"/>
+            <a:off x="7741166" y="3310660"/>
+            <a:ext cx="3247061" cy="1647336"/>
           </a:xfrm>
           <a:prstGeom prst="rect">
             <a:avLst/>

</xml_diff>

<commit_message>
Added visualisation of approach
</commit_message>
<xml_diff>
--- a/images/eda/Presentation1.pptx
+++ b/images/eda/Presentation1.pptx
@@ -5,8 +5,9 @@
     <p:sldMasterId id="2147483648" r:id="rId1"/>
   </p:sldMasterIdLst>
   <p:sldIdLst>
-    <p:sldId id="256" r:id="rId2"/>
-    <p:sldId id="257" r:id="rId3"/>
+    <p:sldId id="262" r:id="rId2"/>
+    <p:sldId id="256" r:id="rId3"/>
+    <p:sldId id="257" r:id="rId4"/>
   </p:sldIdLst>
   <p:sldSz cx="12192000" cy="6858000"/>
   <p:notesSz cx="6858000" cy="9144000"/>
@@ -208,35 +209,35 @@
               <a:buNone/>
               <a:defRPr sz="2400"/>
             </a:lvl1pPr>
-            <a:lvl2pPr marL="457200" indent="0" algn="ctr">
+            <a:lvl2pPr marL="457211" indent="0" algn="ctr">
               <a:buNone/>
               <a:defRPr sz="2000"/>
             </a:lvl2pPr>
-            <a:lvl3pPr marL="914400" indent="0" algn="ctr">
+            <a:lvl3pPr marL="914423" indent="0" algn="ctr">
               <a:buNone/>
-              <a:defRPr sz="1800"/>
+              <a:defRPr sz="1801"/>
             </a:lvl3pPr>
-            <a:lvl4pPr marL="1371600" indent="0" algn="ctr">
+            <a:lvl4pPr marL="1371634" indent="0" algn="ctr">
               <a:buNone/>
               <a:defRPr sz="1600"/>
             </a:lvl4pPr>
-            <a:lvl5pPr marL="1828800" indent="0" algn="ctr">
+            <a:lvl5pPr marL="1828846" indent="0" algn="ctr">
               <a:buNone/>
               <a:defRPr sz="1600"/>
             </a:lvl5pPr>
-            <a:lvl6pPr marL="2286000" indent="0" algn="ctr">
+            <a:lvl6pPr marL="2286057" indent="0" algn="ctr">
               <a:buNone/>
               <a:defRPr sz="1600"/>
             </a:lvl6pPr>
-            <a:lvl7pPr marL="2743200" indent="0" algn="ctr">
+            <a:lvl7pPr marL="2743269" indent="0" algn="ctr">
               <a:buNone/>
               <a:defRPr sz="1600"/>
             </a:lvl7pPr>
-            <a:lvl8pPr marL="3200400" indent="0" algn="ctr">
+            <a:lvl8pPr marL="3200480" indent="0" algn="ctr">
               <a:buNone/>
               <a:defRPr sz="1600"/>
             </a:lvl8pPr>
-            <a:lvl9pPr marL="3657600" indent="0" algn="ctr">
+            <a:lvl9pPr marL="3657691" indent="0" algn="ctr">
               <a:buNone/>
               <a:defRPr sz="1600"/>
             </a:lvl9pPr>
@@ -273,7 +274,7 @@
           <a:p>
             <a:fld id="{718E323C-DBA5-4272-AACA-840E2D89880F}" type="datetimeFigureOut">
               <a:rPr lang="en-GB" smtClean="0"/>
-              <a:t>04/12/2023</a:t>
+              <a:t>09/12/2023</a:t>
             </a:fld>
             <a:endParaRPr lang="en-GB"/>
           </a:p>
@@ -473,7 +474,7 @@
           <a:p>
             <a:fld id="{718E323C-DBA5-4272-AACA-840E2D89880F}" type="datetimeFigureOut">
               <a:rPr lang="en-GB" smtClean="0"/>
-              <a:t>04/12/2023</a:t>
+              <a:t>09/12/2023</a:t>
             </a:fld>
             <a:endParaRPr lang="en-GB"/>
           </a:p>
@@ -683,7 +684,7 @@
           <a:p>
             <a:fld id="{718E323C-DBA5-4272-AACA-840E2D89880F}" type="datetimeFigureOut">
               <a:rPr lang="en-GB" smtClean="0"/>
-              <a:t>04/12/2023</a:t>
+              <a:t>09/12/2023</a:t>
             </a:fld>
             <a:endParaRPr lang="en-GB"/>
           </a:p>
@@ -883,7 +884,7 @@
           <a:p>
             <a:fld id="{718E323C-DBA5-4272-AACA-840E2D89880F}" type="datetimeFigureOut">
               <a:rPr lang="en-GB" smtClean="0"/>
-              <a:t>04/12/2023</a:t>
+              <a:t>09/12/2023</a:t>
             </a:fld>
             <a:endParaRPr lang="en-GB"/>
           </a:p>
@@ -991,7 +992,7 @@
         </p:nvSpPr>
         <p:spPr>
           <a:xfrm>
-            <a:off x="831850" y="1709738"/>
+            <a:off x="831850" y="1709740"/>
             <a:ext cx="10515600" cy="2852737"/>
           </a:xfrm>
         </p:spPr>
@@ -1029,7 +1030,7 @@
         </p:nvSpPr>
         <p:spPr>
           <a:xfrm>
-            <a:off x="831850" y="4589463"/>
+            <a:off x="831850" y="4589465"/>
             <a:ext cx="10515600" cy="1500187"/>
           </a:xfrm>
         </p:spPr>
@@ -1046,7 +1047,7 @@
                 </a:solidFill>
               </a:defRPr>
             </a:lvl1pPr>
-            <a:lvl2pPr marL="457200" indent="0">
+            <a:lvl2pPr marL="457211" indent="0">
               <a:buNone/>
               <a:defRPr sz="2000">
                 <a:solidFill>
@@ -1056,9 +1057,9 @@
                 </a:solidFill>
               </a:defRPr>
             </a:lvl2pPr>
-            <a:lvl3pPr marL="914400" indent="0">
+            <a:lvl3pPr marL="914423" indent="0">
               <a:buNone/>
-              <a:defRPr sz="1800">
+              <a:defRPr sz="1801">
                 <a:solidFill>
                   <a:schemeClr val="tx1">
                     <a:tint val="75000"/>
@@ -1066,7 +1067,7 @@
                 </a:solidFill>
               </a:defRPr>
             </a:lvl3pPr>
-            <a:lvl4pPr marL="1371600" indent="0">
+            <a:lvl4pPr marL="1371634" indent="0">
               <a:buNone/>
               <a:defRPr sz="1600">
                 <a:solidFill>
@@ -1076,7 +1077,7 @@
                 </a:solidFill>
               </a:defRPr>
             </a:lvl4pPr>
-            <a:lvl5pPr marL="1828800" indent="0">
+            <a:lvl5pPr marL="1828846" indent="0">
               <a:buNone/>
               <a:defRPr sz="1600">
                 <a:solidFill>
@@ -1086,7 +1087,7 @@
                 </a:solidFill>
               </a:defRPr>
             </a:lvl5pPr>
-            <a:lvl6pPr marL="2286000" indent="0">
+            <a:lvl6pPr marL="2286057" indent="0">
               <a:buNone/>
               <a:defRPr sz="1600">
                 <a:solidFill>
@@ -1096,7 +1097,7 @@
                 </a:solidFill>
               </a:defRPr>
             </a:lvl6pPr>
-            <a:lvl7pPr marL="2743200" indent="0">
+            <a:lvl7pPr marL="2743269" indent="0">
               <a:buNone/>
               <a:defRPr sz="1600">
                 <a:solidFill>
@@ -1106,7 +1107,7 @@
                 </a:solidFill>
               </a:defRPr>
             </a:lvl7pPr>
-            <a:lvl8pPr marL="3200400" indent="0">
+            <a:lvl8pPr marL="3200480" indent="0">
               <a:buNone/>
               <a:defRPr sz="1600">
                 <a:solidFill>
@@ -1116,7 +1117,7 @@
                 </a:solidFill>
               </a:defRPr>
             </a:lvl8pPr>
-            <a:lvl9pPr marL="3657600" indent="0">
+            <a:lvl9pPr marL="3657691" indent="0">
               <a:buNone/>
               <a:defRPr sz="1600">
                 <a:solidFill>
@@ -1159,7 +1160,7 @@
           <a:p>
             <a:fld id="{718E323C-DBA5-4272-AACA-840E2D89880F}" type="datetimeFigureOut">
               <a:rPr lang="en-GB" smtClean="0"/>
-              <a:t>04/12/2023</a:t>
+              <a:t>09/12/2023</a:t>
             </a:fld>
             <a:endParaRPr lang="en-GB"/>
           </a:p>
@@ -1296,7 +1297,7 @@
         </p:nvSpPr>
         <p:spPr>
           <a:xfrm>
-            <a:off x="838200" y="1825625"/>
+            <a:off x="838201" y="1825625"/>
             <a:ext cx="5181600" cy="4351338"/>
           </a:xfrm>
         </p:spPr>
@@ -1359,7 +1360,7 @@
         </p:nvSpPr>
         <p:spPr>
           <a:xfrm>
-            <a:off x="6172200" y="1825625"/>
+            <a:off x="6172201" y="1825625"/>
             <a:ext cx="5181600" cy="4351338"/>
           </a:xfrm>
         </p:spPr>
@@ -1427,7 +1428,7 @@
           <a:p>
             <a:fld id="{718E323C-DBA5-4272-AACA-840E2D89880F}" type="datetimeFigureOut">
               <a:rPr lang="en-GB" smtClean="0"/>
-              <a:t>04/12/2023</a:t>
+              <a:t>09/12/2023</a:t>
             </a:fld>
             <a:endParaRPr lang="en-GB"/>
           </a:p>
@@ -1535,7 +1536,7 @@
         </p:nvSpPr>
         <p:spPr>
           <a:xfrm>
-            <a:off x="839788" y="365125"/>
+            <a:off x="839789" y="365127"/>
             <a:ext cx="10515600" cy="1325563"/>
           </a:xfrm>
         </p:spPr>
@@ -1580,35 +1581,35 @@
               <a:buNone/>
               <a:defRPr sz="2400" b="1"/>
             </a:lvl1pPr>
-            <a:lvl2pPr marL="457200" indent="0">
+            <a:lvl2pPr marL="457211" indent="0">
               <a:buNone/>
               <a:defRPr sz="2000" b="1"/>
             </a:lvl2pPr>
-            <a:lvl3pPr marL="914400" indent="0">
+            <a:lvl3pPr marL="914423" indent="0">
               <a:buNone/>
-              <a:defRPr sz="1800" b="1"/>
+              <a:defRPr sz="1801" b="1"/>
             </a:lvl3pPr>
-            <a:lvl4pPr marL="1371600" indent="0">
+            <a:lvl4pPr marL="1371634" indent="0">
               <a:buNone/>
               <a:defRPr sz="1600" b="1"/>
             </a:lvl4pPr>
-            <a:lvl5pPr marL="1828800" indent="0">
+            <a:lvl5pPr marL="1828846" indent="0">
               <a:buNone/>
               <a:defRPr sz="1600" b="1"/>
             </a:lvl5pPr>
-            <a:lvl6pPr marL="2286000" indent="0">
+            <a:lvl6pPr marL="2286057" indent="0">
               <a:buNone/>
               <a:defRPr sz="1600" b="1"/>
             </a:lvl6pPr>
-            <a:lvl7pPr marL="2743200" indent="0">
+            <a:lvl7pPr marL="2743269" indent="0">
               <a:buNone/>
               <a:defRPr sz="1600" b="1"/>
             </a:lvl7pPr>
-            <a:lvl8pPr marL="3200400" indent="0">
+            <a:lvl8pPr marL="3200480" indent="0">
               <a:buNone/>
               <a:defRPr sz="1600" b="1"/>
             </a:lvl8pPr>
-            <a:lvl9pPr marL="3657600" indent="0">
+            <a:lvl9pPr marL="3657691" indent="0">
               <a:buNone/>
               <a:defRPr sz="1600" b="1"/>
             </a:lvl9pPr>
@@ -1714,35 +1715,35 @@
               <a:buNone/>
               <a:defRPr sz="2400" b="1"/>
             </a:lvl1pPr>
-            <a:lvl2pPr marL="457200" indent="0">
+            <a:lvl2pPr marL="457211" indent="0">
               <a:buNone/>
               <a:defRPr sz="2000" b="1"/>
             </a:lvl2pPr>
-            <a:lvl3pPr marL="914400" indent="0">
+            <a:lvl3pPr marL="914423" indent="0">
               <a:buNone/>
-              <a:defRPr sz="1800" b="1"/>
+              <a:defRPr sz="1801" b="1"/>
             </a:lvl3pPr>
-            <a:lvl4pPr marL="1371600" indent="0">
+            <a:lvl4pPr marL="1371634" indent="0">
               <a:buNone/>
               <a:defRPr sz="1600" b="1"/>
             </a:lvl4pPr>
-            <a:lvl5pPr marL="1828800" indent="0">
+            <a:lvl5pPr marL="1828846" indent="0">
               <a:buNone/>
               <a:defRPr sz="1600" b="1"/>
             </a:lvl5pPr>
-            <a:lvl6pPr marL="2286000" indent="0">
+            <a:lvl6pPr marL="2286057" indent="0">
               <a:buNone/>
               <a:defRPr sz="1600" b="1"/>
             </a:lvl6pPr>
-            <a:lvl7pPr marL="2743200" indent="0">
+            <a:lvl7pPr marL="2743269" indent="0">
               <a:buNone/>
               <a:defRPr sz="1600" b="1"/>
             </a:lvl7pPr>
-            <a:lvl8pPr marL="3200400" indent="0">
+            <a:lvl8pPr marL="3200480" indent="0">
               <a:buNone/>
               <a:defRPr sz="1600" b="1"/>
             </a:lvl8pPr>
-            <a:lvl9pPr marL="3657600" indent="0">
+            <a:lvl9pPr marL="3657691" indent="0">
               <a:buNone/>
               <a:defRPr sz="1600" b="1"/>
             </a:lvl9pPr>
@@ -1842,7 +1843,7 @@
           <a:p>
             <a:fld id="{718E323C-DBA5-4272-AACA-840E2D89880F}" type="datetimeFigureOut">
               <a:rPr lang="en-GB" smtClean="0"/>
-              <a:t>04/12/2023</a:t>
+              <a:t>09/12/2023</a:t>
             </a:fld>
             <a:endParaRPr lang="en-GB"/>
           </a:p>
@@ -1984,7 +1985,7 @@
           <a:p>
             <a:fld id="{718E323C-DBA5-4272-AACA-840E2D89880F}" type="datetimeFigureOut">
               <a:rPr lang="en-GB" smtClean="0"/>
-              <a:t>04/12/2023</a:t>
+              <a:t>09/12/2023</a:t>
             </a:fld>
             <a:endParaRPr lang="en-GB"/>
           </a:p>
@@ -2097,7 +2098,7 @@
           <a:p>
             <a:fld id="{718E323C-DBA5-4272-AACA-840E2D89880F}" type="datetimeFigureOut">
               <a:rPr lang="en-GB" smtClean="0"/>
-              <a:t>04/12/2023</a:t>
+              <a:t>09/12/2023</a:t>
             </a:fld>
             <a:endParaRPr lang="en-GB"/>
           </a:p>
@@ -2205,8 +2206,8 @@
         </p:nvSpPr>
         <p:spPr>
           <a:xfrm>
-            <a:off x="839788" y="457200"/>
-            <a:ext cx="3932237" cy="1600200"/>
+            <a:off x="839789" y="457200"/>
+            <a:ext cx="3932238" cy="1600200"/>
           </a:xfrm>
         </p:spPr>
         <p:txBody>
@@ -2243,8 +2244,8 @@
         </p:nvSpPr>
         <p:spPr>
           <a:xfrm>
-            <a:off x="5183188" y="987425"/>
-            <a:ext cx="6172200" cy="4873625"/>
+            <a:off x="5183188" y="987427"/>
+            <a:ext cx="6172201" cy="4873625"/>
           </a:xfrm>
         </p:spPr>
         <p:txBody>
@@ -2334,8 +2335,8 @@
         </p:nvSpPr>
         <p:spPr>
           <a:xfrm>
-            <a:off x="839788" y="2057400"/>
-            <a:ext cx="3932237" cy="3811588"/>
+            <a:off x="839789" y="2057400"/>
+            <a:ext cx="3932238" cy="3811588"/>
           </a:xfrm>
         </p:spPr>
         <p:txBody>
@@ -2345,37 +2346,37 @@
               <a:buNone/>
               <a:defRPr sz="1600"/>
             </a:lvl1pPr>
-            <a:lvl2pPr marL="457200" indent="0">
+            <a:lvl2pPr marL="457211" indent="0">
               <a:buNone/>
-              <a:defRPr sz="1400"/>
+              <a:defRPr sz="1401"/>
             </a:lvl2pPr>
-            <a:lvl3pPr marL="914400" indent="0">
+            <a:lvl3pPr marL="914423" indent="0">
               <a:buNone/>
               <a:defRPr sz="1200"/>
             </a:lvl3pPr>
-            <a:lvl4pPr marL="1371600" indent="0">
+            <a:lvl4pPr marL="1371634" indent="0">
               <a:buNone/>
-              <a:defRPr sz="1000"/>
+              <a:defRPr sz="1001"/>
             </a:lvl4pPr>
-            <a:lvl5pPr marL="1828800" indent="0">
+            <a:lvl5pPr marL="1828846" indent="0">
               <a:buNone/>
-              <a:defRPr sz="1000"/>
+              <a:defRPr sz="1001"/>
             </a:lvl5pPr>
-            <a:lvl6pPr marL="2286000" indent="0">
+            <a:lvl6pPr marL="2286057" indent="0">
               <a:buNone/>
-              <a:defRPr sz="1000"/>
+              <a:defRPr sz="1001"/>
             </a:lvl6pPr>
-            <a:lvl7pPr marL="2743200" indent="0">
+            <a:lvl7pPr marL="2743269" indent="0">
               <a:buNone/>
-              <a:defRPr sz="1000"/>
+              <a:defRPr sz="1001"/>
             </a:lvl7pPr>
-            <a:lvl8pPr marL="3200400" indent="0">
+            <a:lvl8pPr marL="3200480" indent="0">
               <a:buNone/>
-              <a:defRPr sz="1000"/>
+              <a:defRPr sz="1001"/>
             </a:lvl8pPr>
-            <a:lvl9pPr marL="3657600" indent="0">
+            <a:lvl9pPr marL="3657691" indent="0">
               <a:buNone/>
-              <a:defRPr sz="1000"/>
+              <a:defRPr sz="1001"/>
             </a:lvl9pPr>
           </a:lstStyle>
           <a:p>
@@ -2410,7 +2411,7 @@
           <a:p>
             <a:fld id="{718E323C-DBA5-4272-AACA-840E2D89880F}" type="datetimeFigureOut">
               <a:rPr lang="en-GB" smtClean="0"/>
-              <a:t>04/12/2023</a:t>
+              <a:t>09/12/2023</a:t>
             </a:fld>
             <a:endParaRPr lang="en-GB"/>
           </a:p>
@@ -2518,8 +2519,8 @@
         </p:nvSpPr>
         <p:spPr>
           <a:xfrm>
-            <a:off x="839788" y="457200"/>
-            <a:ext cx="3932237" cy="1600200"/>
+            <a:off x="839789" y="457200"/>
+            <a:ext cx="3932238" cy="1600200"/>
           </a:xfrm>
         </p:spPr>
         <p:txBody>
@@ -2556,8 +2557,8 @@
         </p:nvSpPr>
         <p:spPr>
           <a:xfrm>
-            <a:off x="5183188" y="987425"/>
-            <a:ext cx="6172200" cy="4873625"/>
+            <a:off x="5183188" y="987427"/>
+            <a:ext cx="6172201" cy="4873625"/>
           </a:xfrm>
         </p:spPr>
         <p:txBody>
@@ -2567,35 +2568,35 @@
               <a:buNone/>
               <a:defRPr sz="3200"/>
             </a:lvl1pPr>
-            <a:lvl2pPr marL="457200" indent="0">
+            <a:lvl2pPr marL="457211" indent="0">
               <a:buNone/>
               <a:defRPr sz="2800"/>
             </a:lvl2pPr>
-            <a:lvl3pPr marL="914400" indent="0">
+            <a:lvl3pPr marL="914423" indent="0">
               <a:buNone/>
               <a:defRPr sz="2400"/>
             </a:lvl3pPr>
-            <a:lvl4pPr marL="1371600" indent="0">
+            <a:lvl4pPr marL="1371634" indent="0">
               <a:buNone/>
               <a:defRPr sz="2000"/>
             </a:lvl4pPr>
-            <a:lvl5pPr marL="1828800" indent="0">
+            <a:lvl5pPr marL="1828846" indent="0">
               <a:buNone/>
               <a:defRPr sz="2000"/>
             </a:lvl5pPr>
-            <a:lvl6pPr marL="2286000" indent="0">
+            <a:lvl6pPr marL="2286057" indent="0">
               <a:buNone/>
               <a:defRPr sz="2000"/>
             </a:lvl6pPr>
-            <a:lvl7pPr marL="2743200" indent="0">
+            <a:lvl7pPr marL="2743269" indent="0">
               <a:buNone/>
               <a:defRPr sz="2000"/>
             </a:lvl7pPr>
-            <a:lvl8pPr marL="3200400" indent="0">
+            <a:lvl8pPr marL="3200480" indent="0">
               <a:buNone/>
               <a:defRPr sz="2000"/>
             </a:lvl8pPr>
-            <a:lvl9pPr marL="3657600" indent="0">
+            <a:lvl9pPr marL="3657691" indent="0">
               <a:buNone/>
               <a:defRPr sz="2000"/>
             </a:lvl9pPr>
@@ -2623,8 +2624,8 @@
         </p:nvSpPr>
         <p:spPr>
           <a:xfrm>
-            <a:off x="839788" y="2057400"/>
-            <a:ext cx="3932237" cy="3811588"/>
+            <a:off x="839789" y="2057400"/>
+            <a:ext cx="3932238" cy="3811588"/>
           </a:xfrm>
         </p:spPr>
         <p:txBody>
@@ -2634,37 +2635,37 @@
               <a:buNone/>
               <a:defRPr sz="1600"/>
             </a:lvl1pPr>
-            <a:lvl2pPr marL="457200" indent="0">
+            <a:lvl2pPr marL="457211" indent="0">
               <a:buNone/>
-              <a:defRPr sz="1400"/>
+              <a:defRPr sz="1401"/>
             </a:lvl2pPr>
-            <a:lvl3pPr marL="914400" indent="0">
+            <a:lvl3pPr marL="914423" indent="0">
               <a:buNone/>
               <a:defRPr sz="1200"/>
             </a:lvl3pPr>
-            <a:lvl4pPr marL="1371600" indent="0">
+            <a:lvl4pPr marL="1371634" indent="0">
               <a:buNone/>
-              <a:defRPr sz="1000"/>
+              <a:defRPr sz="1001"/>
             </a:lvl4pPr>
-            <a:lvl5pPr marL="1828800" indent="0">
+            <a:lvl5pPr marL="1828846" indent="0">
               <a:buNone/>
-              <a:defRPr sz="1000"/>
+              <a:defRPr sz="1001"/>
             </a:lvl5pPr>
-            <a:lvl6pPr marL="2286000" indent="0">
+            <a:lvl6pPr marL="2286057" indent="0">
               <a:buNone/>
-              <a:defRPr sz="1000"/>
+              <a:defRPr sz="1001"/>
             </a:lvl6pPr>
-            <a:lvl7pPr marL="2743200" indent="0">
+            <a:lvl7pPr marL="2743269" indent="0">
               <a:buNone/>
-              <a:defRPr sz="1000"/>
+              <a:defRPr sz="1001"/>
             </a:lvl7pPr>
-            <a:lvl8pPr marL="3200400" indent="0">
+            <a:lvl8pPr marL="3200480" indent="0">
               <a:buNone/>
-              <a:defRPr sz="1000"/>
+              <a:defRPr sz="1001"/>
             </a:lvl8pPr>
-            <a:lvl9pPr marL="3657600" indent="0">
+            <a:lvl9pPr marL="3657691" indent="0">
               <a:buNone/>
-              <a:defRPr sz="1000"/>
+              <a:defRPr sz="1001"/>
             </a:lvl9pPr>
           </a:lstStyle>
           <a:p>
@@ -2699,7 +2700,7 @@
           <a:p>
             <a:fld id="{718E323C-DBA5-4272-AACA-840E2D89880F}" type="datetimeFigureOut">
               <a:rPr lang="en-GB" smtClean="0"/>
-              <a:t>04/12/2023</a:t>
+              <a:t>09/12/2023</a:t>
             </a:fld>
             <a:endParaRPr lang="en-GB"/>
           </a:p>
@@ -2812,7 +2813,7 @@
         </p:nvSpPr>
         <p:spPr>
           <a:xfrm>
-            <a:off x="838200" y="365125"/>
+            <a:off x="838201" y="365127"/>
             <a:ext cx="10515600" cy="1325563"/>
           </a:xfrm>
           <a:prstGeom prst="rect">
@@ -2851,7 +2852,7 @@
         </p:nvSpPr>
         <p:spPr>
           <a:xfrm>
-            <a:off x="838200" y="1825625"/>
+            <a:off x="838201" y="1825625"/>
             <a:ext cx="10515600" cy="4351338"/>
           </a:xfrm>
           <a:prstGeom prst="rect">
@@ -2919,7 +2920,7 @@
         </p:nvSpPr>
         <p:spPr>
           <a:xfrm>
-            <a:off x="838200" y="6356350"/>
+            <a:off x="838201" y="6356352"/>
             <a:ext cx="2743200" cy="365125"/>
           </a:xfrm>
           <a:prstGeom prst="rect">
@@ -2942,7 +2943,7 @@
           <a:p>
             <a:fld id="{718E323C-DBA5-4272-AACA-840E2D89880F}" type="datetimeFigureOut">
               <a:rPr lang="en-GB" smtClean="0"/>
-              <a:t>04/12/2023</a:t>
+              <a:t>09/12/2023</a:t>
             </a:fld>
             <a:endParaRPr lang="en-GB"/>
           </a:p>
@@ -2966,7 +2967,7 @@
         </p:nvSpPr>
         <p:spPr>
           <a:xfrm>
-            <a:off x="4038600" y="6356350"/>
+            <a:off x="4038601" y="6356352"/>
             <a:ext cx="4114800" cy="365125"/>
           </a:xfrm>
           <a:prstGeom prst="rect">
@@ -3009,7 +3010,7 @@
         </p:nvSpPr>
         <p:spPr>
           <a:xfrm>
-            <a:off x="8610600" y="6356350"/>
+            <a:off x="8610601" y="6356352"/>
             <a:ext cx="2743200" cy="365125"/>
           </a:xfrm>
           <a:prstGeom prst="rect">
@@ -3061,7 +3062,7 @@
   </p:sldLayoutIdLst>
   <p:txStyles>
     <p:titleStyle>
-      <a:lvl1pPr algn="l" defTabSz="914400" rtl="0" eaLnBrk="1" latinLnBrk="0" hangingPunct="1">
+      <a:lvl1pPr algn="l" defTabSz="914423" rtl="0" eaLnBrk="1" latinLnBrk="0" hangingPunct="1">
         <a:lnSpc>
           <a:spcPct val="90000"/>
         </a:lnSpc>
@@ -3080,12 +3081,12 @@
       </a:lvl1pPr>
     </p:titleStyle>
     <p:bodyStyle>
-      <a:lvl1pPr marL="228600" indent="-228600" algn="l" defTabSz="914400" rtl="0" eaLnBrk="1" latinLnBrk="0" hangingPunct="1">
+      <a:lvl1pPr marL="228606" indent="-228606" algn="l" defTabSz="914423" rtl="0" eaLnBrk="1" latinLnBrk="0" hangingPunct="1">
         <a:lnSpc>
           <a:spcPct val="90000"/>
         </a:lnSpc>
         <a:spcBef>
-          <a:spcPts val="1000"/>
+          <a:spcPts val="1001"/>
         </a:spcBef>
         <a:buFont typeface="Arial" panose="020B0604020202020204" pitchFamily="34" charset="0"/>
         <a:buChar char="•"/>
@@ -3098,7 +3099,7 @@
           <a:cs typeface="+mn-cs"/>
         </a:defRPr>
       </a:lvl1pPr>
-      <a:lvl2pPr marL="685800" indent="-228600" algn="l" defTabSz="914400" rtl="0" eaLnBrk="1" latinLnBrk="0" hangingPunct="1">
+      <a:lvl2pPr marL="685818" indent="-228606" algn="l" defTabSz="914423" rtl="0" eaLnBrk="1" latinLnBrk="0" hangingPunct="1">
         <a:lnSpc>
           <a:spcPct val="90000"/>
         </a:lnSpc>
@@ -3116,7 +3117,7 @@
           <a:cs typeface="+mn-cs"/>
         </a:defRPr>
       </a:lvl2pPr>
-      <a:lvl3pPr marL="1143000" indent="-228600" algn="l" defTabSz="914400" rtl="0" eaLnBrk="1" latinLnBrk="0" hangingPunct="1">
+      <a:lvl3pPr marL="1143029" indent="-228606" algn="l" defTabSz="914423" rtl="0" eaLnBrk="1" latinLnBrk="0" hangingPunct="1">
         <a:lnSpc>
           <a:spcPct val="90000"/>
         </a:lnSpc>
@@ -3134,7 +3135,7 @@
           <a:cs typeface="+mn-cs"/>
         </a:defRPr>
       </a:lvl3pPr>
-      <a:lvl4pPr marL="1600200" indent="-228600" algn="l" defTabSz="914400" rtl="0" eaLnBrk="1" latinLnBrk="0" hangingPunct="1">
+      <a:lvl4pPr marL="1600241" indent="-228606" algn="l" defTabSz="914423" rtl="0" eaLnBrk="1" latinLnBrk="0" hangingPunct="1">
         <a:lnSpc>
           <a:spcPct val="90000"/>
         </a:lnSpc>
@@ -3143,7 +3144,7 @@
         </a:spcBef>
         <a:buFont typeface="Arial" panose="020B0604020202020204" pitchFamily="34" charset="0"/>
         <a:buChar char="•"/>
-        <a:defRPr sz="1800" kern="1200">
+        <a:defRPr sz="1801" kern="1200">
           <a:solidFill>
             <a:schemeClr val="tx1"/>
           </a:solidFill>
@@ -3152,7 +3153,7 @@
           <a:cs typeface="+mn-cs"/>
         </a:defRPr>
       </a:lvl4pPr>
-      <a:lvl5pPr marL="2057400" indent="-228600" algn="l" defTabSz="914400" rtl="0" eaLnBrk="1" latinLnBrk="0" hangingPunct="1">
+      <a:lvl5pPr marL="2057452" indent="-228606" algn="l" defTabSz="914423" rtl="0" eaLnBrk="1" latinLnBrk="0" hangingPunct="1">
         <a:lnSpc>
           <a:spcPct val="90000"/>
         </a:lnSpc>
@@ -3161,7 +3162,7 @@
         </a:spcBef>
         <a:buFont typeface="Arial" panose="020B0604020202020204" pitchFamily="34" charset="0"/>
         <a:buChar char="•"/>
-        <a:defRPr sz="1800" kern="1200">
+        <a:defRPr sz="1801" kern="1200">
           <a:solidFill>
             <a:schemeClr val="tx1"/>
           </a:solidFill>
@@ -3170,7 +3171,7 @@
           <a:cs typeface="+mn-cs"/>
         </a:defRPr>
       </a:lvl5pPr>
-      <a:lvl6pPr marL="2514600" indent="-228600" algn="l" defTabSz="914400" rtl="0" eaLnBrk="1" latinLnBrk="0" hangingPunct="1">
+      <a:lvl6pPr marL="2514663" indent="-228606" algn="l" defTabSz="914423" rtl="0" eaLnBrk="1" latinLnBrk="0" hangingPunct="1">
         <a:lnSpc>
           <a:spcPct val="90000"/>
         </a:lnSpc>
@@ -3179,7 +3180,7 @@
         </a:spcBef>
         <a:buFont typeface="Arial" panose="020B0604020202020204" pitchFamily="34" charset="0"/>
         <a:buChar char="•"/>
-        <a:defRPr sz="1800" kern="1200">
+        <a:defRPr sz="1801" kern="1200">
           <a:solidFill>
             <a:schemeClr val="tx1"/>
           </a:solidFill>
@@ -3188,7 +3189,7 @@
           <a:cs typeface="+mn-cs"/>
         </a:defRPr>
       </a:lvl6pPr>
-      <a:lvl7pPr marL="2971800" indent="-228600" algn="l" defTabSz="914400" rtl="0" eaLnBrk="1" latinLnBrk="0" hangingPunct="1">
+      <a:lvl7pPr marL="2971875" indent="-228606" algn="l" defTabSz="914423" rtl="0" eaLnBrk="1" latinLnBrk="0" hangingPunct="1">
         <a:lnSpc>
           <a:spcPct val="90000"/>
         </a:lnSpc>
@@ -3197,7 +3198,7 @@
         </a:spcBef>
         <a:buFont typeface="Arial" panose="020B0604020202020204" pitchFamily="34" charset="0"/>
         <a:buChar char="•"/>
-        <a:defRPr sz="1800" kern="1200">
+        <a:defRPr sz="1801" kern="1200">
           <a:solidFill>
             <a:schemeClr val="tx1"/>
           </a:solidFill>
@@ -3206,7 +3207,7 @@
           <a:cs typeface="+mn-cs"/>
         </a:defRPr>
       </a:lvl7pPr>
-      <a:lvl8pPr marL="3429000" indent="-228600" algn="l" defTabSz="914400" rtl="0" eaLnBrk="1" latinLnBrk="0" hangingPunct="1">
+      <a:lvl8pPr marL="3429086" indent="-228606" algn="l" defTabSz="914423" rtl="0" eaLnBrk="1" latinLnBrk="0" hangingPunct="1">
         <a:lnSpc>
           <a:spcPct val="90000"/>
         </a:lnSpc>
@@ -3215,7 +3216,7 @@
         </a:spcBef>
         <a:buFont typeface="Arial" panose="020B0604020202020204" pitchFamily="34" charset="0"/>
         <a:buChar char="•"/>
-        <a:defRPr sz="1800" kern="1200">
+        <a:defRPr sz="1801" kern="1200">
           <a:solidFill>
             <a:schemeClr val="tx1"/>
           </a:solidFill>
@@ -3224,7 +3225,7 @@
           <a:cs typeface="+mn-cs"/>
         </a:defRPr>
       </a:lvl8pPr>
-      <a:lvl9pPr marL="3886200" indent="-228600" algn="l" defTabSz="914400" rtl="0" eaLnBrk="1" latinLnBrk="0" hangingPunct="1">
+      <a:lvl9pPr marL="3886298" indent="-228606" algn="l" defTabSz="914423" rtl="0" eaLnBrk="1" latinLnBrk="0" hangingPunct="1">
         <a:lnSpc>
           <a:spcPct val="90000"/>
         </a:lnSpc>
@@ -3233,7 +3234,7 @@
         </a:spcBef>
         <a:buFont typeface="Arial" panose="020B0604020202020204" pitchFamily="34" charset="0"/>
         <a:buChar char="•"/>
-        <a:defRPr sz="1800" kern="1200">
+        <a:defRPr sz="1801" kern="1200">
           <a:solidFill>
             <a:schemeClr val="tx1"/>
           </a:solidFill>
@@ -3247,8 +3248,8 @@
       <a:defPPr>
         <a:defRPr lang="en-US"/>
       </a:defPPr>
-      <a:lvl1pPr marL="0" algn="l" defTabSz="914400" rtl="0" eaLnBrk="1" latinLnBrk="0" hangingPunct="1">
-        <a:defRPr sz="1800" kern="1200">
+      <a:lvl1pPr marL="0" algn="l" defTabSz="914423" rtl="0" eaLnBrk="1" latinLnBrk="0" hangingPunct="1">
+        <a:defRPr sz="1801" kern="1200">
           <a:solidFill>
             <a:schemeClr val="tx1"/>
           </a:solidFill>
@@ -3257,8 +3258,8 @@
           <a:cs typeface="+mn-cs"/>
         </a:defRPr>
       </a:lvl1pPr>
-      <a:lvl2pPr marL="457200" algn="l" defTabSz="914400" rtl="0" eaLnBrk="1" latinLnBrk="0" hangingPunct="1">
-        <a:defRPr sz="1800" kern="1200">
+      <a:lvl2pPr marL="457211" algn="l" defTabSz="914423" rtl="0" eaLnBrk="1" latinLnBrk="0" hangingPunct="1">
+        <a:defRPr sz="1801" kern="1200">
           <a:solidFill>
             <a:schemeClr val="tx1"/>
           </a:solidFill>
@@ -3267,8 +3268,8 @@
           <a:cs typeface="+mn-cs"/>
         </a:defRPr>
       </a:lvl2pPr>
-      <a:lvl3pPr marL="914400" algn="l" defTabSz="914400" rtl="0" eaLnBrk="1" latinLnBrk="0" hangingPunct="1">
-        <a:defRPr sz="1800" kern="1200">
+      <a:lvl3pPr marL="914423" algn="l" defTabSz="914423" rtl="0" eaLnBrk="1" latinLnBrk="0" hangingPunct="1">
+        <a:defRPr sz="1801" kern="1200">
           <a:solidFill>
             <a:schemeClr val="tx1"/>
           </a:solidFill>
@@ -3277,8 +3278,8 @@
           <a:cs typeface="+mn-cs"/>
         </a:defRPr>
       </a:lvl3pPr>
-      <a:lvl4pPr marL="1371600" algn="l" defTabSz="914400" rtl="0" eaLnBrk="1" latinLnBrk="0" hangingPunct="1">
-        <a:defRPr sz="1800" kern="1200">
+      <a:lvl4pPr marL="1371634" algn="l" defTabSz="914423" rtl="0" eaLnBrk="1" latinLnBrk="0" hangingPunct="1">
+        <a:defRPr sz="1801" kern="1200">
           <a:solidFill>
             <a:schemeClr val="tx1"/>
           </a:solidFill>
@@ -3287,8 +3288,8 @@
           <a:cs typeface="+mn-cs"/>
         </a:defRPr>
       </a:lvl4pPr>
-      <a:lvl5pPr marL="1828800" algn="l" defTabSz="914400" rtl="0" eaLnBrk="1" latinLnBrk="0" hangingPunct="1">
-        <a:defRPr sz="1800" kern="1200">
+      <a:lvl5pPr marL="1828846" algn="l" defTabSz="914423" rtl="0" eaLnBrk="1" latinLnBrk="0" hangingPunct="1">
+        <a:defRPr sz="1801" kern="1200">
           <a:solidFill>
             <a:schemeClr val="tx1"/>
           </a:solidFill>
@@ -3297,8 +3298,8 @@
           <a:cs typeface="+mn-cs"/>
         </a:defRPr>
       </a:lvl5pPr>
-      <a:lvl6pPr marL="2286000" algn="l" defTabSz="914400" rtl="0" eaLnBrk="1" latinLnBrk="0" hangingPunct="1">
-        <a:defRPr sz="1800" kern="1200">
+      <a:lvl6pPr marL="2286057" algn="l" defTabSz="914423" rtl="0" eaLnBrk="1" latinLnBrk="0" hangingPunct="1">
+        <a:defRPr sz="1801" kern="1200">
           <a:solidFill>
             <a:schemeClr val="tx1"/>
           </a:solidFill>
@@ -3307,8 +3308,8 @@
           <a:cs typeface="+mn-cs"/>
         </a:defRPr>
       </a:lvl6pPr>
-      <a:lvl7pPr marL="2743200" algn="l" defTabSz="914400" rtl="0" eaLnBrk="1" latinLnBrk="0" hangingPunct="1">
-        <a:defRPr sz="1800" kern="1200">
+      <a:lvl7pPr marL="2743269" algn="l" defTabSz="914423" rtl="0" eaLnBrk="1" latinLnBrk="0" hangingPunct="1">
+        <a:defRPr sz="1801" kern="1200">
           <a:solidFill>
             <a:schemeClr val="tx1"/>
           </a:solidFill>
@@ -3317,8 +3318,8 @@
           <a:cs typeface="+mn-cs"/>
         </a:defRPr>
       </a:lvl7pPr>
-      <a:lvl8pPr marL="3200400" algn="l" defTabSz="914400" rtl="0" eaLnBrk="1" latinLnBrk="0" hangingPunct="1">
-        <a:defRPr sz="1800" kern="1200">
+      <a:lvl8pPr marL="3200480" algn="l" defTabSz="914423" rtl="0" eaLnBrk="1" latinLnBrk="0" hangingPunct="1">
+        <a:defRPr sz="1801" kern="1200">
           <a:solidFill>
             <a:schemeClr val="tx1"/>
           </a:solidFill>
@@ -3327,8 +3328,8 @@
           <a:cs typeface="+mn-cs"/>
         </a:defRPr>
       </a:lvl8pPr>
-      <a:lvl9pPr marL="3657600" algn="l" defTabSz="914400" rtl="0" eaLnBrk="1" latinLnBrk="0" hangingPunct="1">
-        <a:defRPr sz="1800" kern="1200">
+      <a:lvl9pPr marL="3657691" algn="l" defTabSz="914423" rtl="0" eaLnBrk="1" latinLnBrk="0" hangingPunct="1">
+        <a:defRPr sz="1801" kern="1200">
           <a:solidFill>
             <a:schemeClr val="tx1"/>
           </a:solidFill>
@@ -3359,6 +3360,2614 @@
           <a:chExt cx="0" cy="0"/>
         </a:xfrm>
       </p:grpSpPr>
+      <p:sp>
+        <p:nvSpPr>
+          <p:cNvPr id="17" name="Rechteck 16">
+            <a:extLst>
+              <a:ext uri="{FF2B5EF4-FFF2-40B4-BE49-F238E27FC236}">
+                <a16:creationId xmlns:a16="http://schemas.microsoft.com/office/drawing/2014/main" id="{07923A32-DFDC-932D-6AC3-55E0AF2E53A5}"/>
+              </a:ext>
+            </a:extLst>
+          </p:cNvPr>
+          <p:cNvSpPr/>
+          <p:nvPr/>
+        </p:nvSpPr>
+        <p:spPr>
+          <a:xfrm>
+            <a:off x="357353" y="1714416"/>
+            <a:ext cx="1314893" cy="535800"/>
+          </a:xfrm>
+          <a:prstGeom prst="rect">
+            <a:avLst/>
+          </a:prstGeom>
+          <a:noFill/>
+          <a:ln w="19050">
+            <a:solidFill>
+              <a:schemeClr val="tx1"/>
+            </a:solidFill>
+          </a:ln>
+        </p:spPr>
+        <p:style>
+          <a:lnRef idx="2">
+            <a:schemeClr val="accent1">
+              <a:shade val="15000"/>
+            </a:schemeClr>
+          </a:lnRef>
+          <a:fillRef idx="1">
+            <a:schemeClr val="accent1"/>
+          </a:fillRef>
+          <a:effectRef idx="0">
+            <a:schemeClr val="accent1"/>
+          </a:effectRef>
+          <a:fontRef idx="minor">
+            <a:schemeClr val="lt1"/>
+          </a:fontRef>
+        </p:style>
+        <p:txBody>
+          <a:bodyPr rtlCol="0" anchor="ctr"/>
+          <a:lstStyle/>
+          <a:p>
+            <a:pPr algn="ctr"/>
+            <a:r>
+              <a:rPr lang="de-DE" sz="1600" dirty="0">
+                <a:solidFill>
+                  <a:schemeClr val="tx1"/>
+                </a:solidFill>
+                <a:latin typeface="Arial" panose="020B0604020202020204" pitchFamily="34" charset="0"/>
+                <a:cs typeface="Arial" panose="020B0604020202020204" pitchFamily="34" charset="0"/>
+              </a:rPr>
+              <a:t>Rule-</a:t>
+            </a:r>
+            <a:r>
+              <a:rPr lang="de-DE" sz="1600" dirty="0" err="1">
+                <a:solidFill>
+                  <a:schemeClr val="tx1"/>
+                </a:solidFill>
+                <a:latin typeface="Arial" panose="020B0604020202020204" pitchFamily="34" charset="0"/>
+                <a:cs typeface="Arial" panose="020B0604020202020204" pitchFamily="34" charset="0"/>
+              </a:rPr>
+              <a:t>based</a:t>
+            </a:r>
+            <a:endParaRPr lang="en-US" sz="1600" dirty="0">
+              <a:solidFill>
+                <a:schemeClr val="tx1"/>
+              </a:solidFill>
+              <a:latin typeface="Arial" panose="020B0604020202020204" pitchFamily="34" charset="0"/>
+              <a:cs typeface="Arial" panose="020B0604020202020204" pitchFamily="34" charset="0"/>
+            </a:endParaRPr>
+          </a:p>
+        </p:txBody>
+      </p:sp>
+      <p:sp>
+        <p:nvSpPr>
+          <p:cNvPr id="18" name="Flussdiagramm: Dokument 17">
+            <a:extLst>
+              <a:ext uri="{FF2B5EF4-FFF2-40B4-BE49-F238E27FC236}">
+                <a16:creationId xmlns:a16="http://schemas.microsoft.com/office/drawing/2014/main" id="{E2473B79-362B-D583-AA7F-ADE489A40F62}"/>
+              </a:ext>
+            </a:extLst>
+          </p:cNvPr>
+          <p:cNvSpPr/>
+          <p:nvPr/>
+        </p:nvSpPr>
+        <p:spPr>
+          <a:xfrm>
+            <a:off x="2140973" y="1354995"/>
+            <a:ext cx="1403497" cy="1254642"/>
+          </a:xfrm>
+          <a:prstGeom prst="flowChartDocument">
+            <a:avLst/>
+          </a:prstGeom>
+          <a:noFill/>
+          <a:ln w="19050"/>
+        </p:spPr>
+        <p:style>
+          <a:lnRef idx="2">
+            <a:schemeClr val="accent1">
+              <a:shade val="15000"/>
+            </a:schemeClr>
+          </a:lnRef>
+          <a:fillRef idx="1">
+            <a:schemeClr val="accent1"/>
+          </a:fillRef>
+          <a:effectRef idx="0">
+            <a:schemeClr val="accent1"/>
+          </a:effectRef>
+          <a:fontRef idx="minor">
+            <a:schemeClr val="lt1"/>
+          </a:fontRef>
+        </p:style>
+        <p:txBody>
+          <a:bodyPr rtlCol="0" anchor="ctr"/>
+          <a:lstStyle/>
+          <a:p>
+            <a:pPr algn="ctr"/>
+            <a:r>
+              <a:rPr lang="de-DE" sz="1600" dirty="0" err="1">
+                <a:solidFill>
+                  <a:schemeClr val="tx1"/>
+                </a:solidFill>
+                <a:latin typeface="Arial" panose="020B0604020202020204" pitchFamily="34" charset="0"/>
+                <a:cs typeface="Arial" panose="020B0604020202020204" pitchFamily="34" charset="0"/>
+              </a:rPr>
+              <a:t>Sentences</a:t>
+            </a:r>
+            <a:r>
+              <a:rPr lang="de-DE" sz="1600" dirty="0">
+                <a:solidFill>
+                  <a:schemeClr val="tx1"/>
+                </a:solidFill>
+                <a:latin typeface="Arial" panose="020B0604020202020204" pitchFamily="34" charset="0"/>
+                <a:cs typeface="Arial" panose="020B0604020202020204" pitchFamily="34" charset="0"/>
+              </a:rPr>
+              <a:t> </a:t>
+            </a:r>
+            <a:r>
+              <a:rPr lang="de-DE" sz="1600" dirty="0" err="1">
+                <a:solidFill>
+                  <a:schemeClr val="tx1"/>
+                </a:solidFill>
+                <a:latin typeface="Arial" panose="020B0604020202020204" pitchFamily="34" charset="0"/>
+                <a:cs typeface="Arial" panose="020B0604020202020204" pitchFamily="34" charset="0"/>
+              </a:rPr>
+              <a:t>with</a:t>
+            </a:r>
+            <a:r>
+              <a:rPr lang="de-DE" sz="1600" dirty="0">
+                <a:solidFill>
+                  <a:schemeClr val="tx1"/>
+                </a:solidFill>
+                <a:latin typeface="Arial" panose="020B0604020202020204" pitchFamily="34" charset="0"/>
+                <a:cs typeface="Arial" panose="020B0604020202020204" pitchFamily="34" charset="0"/>
+              </a:rPr>
+              <a:t> </a:t>
+            </a:r>
+            <a:r>
+              <a:rPr lang="de-DE" sz="1600" dirty="0" err="1">
+                <a:solidFill>
+                  <a:schemeClr val="tx1"/>
+                </a:solidFill>
+                <a:latin typeface="Arial" panose="020B0604020202020204" pitchFamily="34" charset="0"/>
+                <a:cs typeface="Arial" panose="020B0604020202020204" pitchFamily="34" charset="0"/>
+              </a:rPr>
+              <a:t>assigned</a:t>
+            </a:r>
+            <a:r>
+              <a:rPr lang="de-DE" sz="1600" dirty="0">
+                <a:solidFill>
+                  <a:schemeClr val="tx1"/>
+                </a:solidFill>
+                <a:latin typeface="Arial" panose="020B0604020202020204" pitchFamily="34" charset="0"/>
+                <a:cs typeface="Arial" panose="020B0604020202020204" pitchFamily="34" charset="0"/>
+              </a:rPr>
+              <a:t> </a:t>
+            </a:r>
+            <a:r>
+              <a:rPr lang="de-DE" sz="1600" dirty="0" err="1">
+                <a:solidFill>
+                  <a:schemeClr val="tx1"/>
+                </a:solidFill>
+                <a:latin typeface="Arial" panose="020B0604020202020204" pitchFamily="34" charset="0"/>
+                <a:cs typeface="Arial" panose="020B0604020202020204" pitchFamily="34" charset="0"/>
+              </a:rPr>
+              <a:t>metric</a:t>
+            </a:r>
+            <a:r>
+              <a:rPr lang="de-DE" sz="1600" dirty="0">
+                <a:solidFill>
+                  <a:schemeClr val="tx1"/>
+                </a:solidFill>
+                <a:latin typeface="Arial" panose="020B0604020202020204" pitchFamily="34" charset="0"/>
+                <a:cs typeface="Arial" panose="020B0604020202020204" pitchFamily="34" charset="0"/>
+              </a:rPr>
+              <a:t>(s)</a:t>
+            </a:r>
+            <a:endParaRPr lang="en-US" sz="1600" dirty="0">
+              <a:solidFill>
+                <a:schemeClr val="tx1"/>
+              </a:solidFill>
+              <a:latin typeface="Arial" panose="020B0604020202020204" pitchFamily="34" charset="0"/>
+              <a:cs typeface="Arial" panose="020B0604020202020204" pitchFamily="34" charset="0"/>
+            </a:endParaRPr>
+          </a:p>
+        </p:txBody>
+      </p:sp>
+      <p:sp>
+        <p:nvSpPr>
+          <p:cNvPr id="19" name="Flussdiagramm: Mehrere Dokumente 18">
+            <a:extLst>
+              <a:ext uri="{FF2B5EF4-FFF2-40B4-BE49-F238E27FC236}">
+                <a16:creationId xmlns:a16="http://schemas.microsoft.com/office/drawing/2014/main" id="{800EC522-48EC-E959-F423-2E1C6C0380CE}"/>
+              </a:ext>
+            </a:extLst>
+          </p:cNvPr>
+          <p:cNvSpPr/>
+          <p:nvPr/>
+        </p:nvSpPr>
+        <p:spPr>
+          <a:xfrm>
+            <a:off x="275717" y="2778557"/>
+            <a:ext cx="1314893" cy="1148323"/>
+          </a:xfrm>
+          <a:prstGeom prst="flowChartMultidocument">
+            <a:avLst/>
+          </a:prstGeom>
+          <a:noFill/>
+          <a:ln w="19050"/>
+        </p:spPr>
+        <p:style>
+          <a:lnRef idx="2">
+            <a:schemeClr val="accent1">
+              <a:shade val="15000"/>
+            </a:schemeClr>
+          </a:lnRef>
+          <a:fillRef idx="1">
+            <a:schemeClr val="accent1"/>
+          </a:fillRef>
+          <a:effectRef idx="0">
+            <a:schemeClr val="accent1"/>
+          </a:effectRef>
+          <a:fontRef idx="minor">
+            <a:schemeClr val="lt1"/>
+          </a:fontRef>
+        </p:style>
+        <p:txBody>
+          <a:bodyPr rtlCol="0" anchor="ctr"/>
+          <a:lstStyle/>
+          <a:p>
+            <a:pPr algn="ctr"/>
+            <a:r>
+              <a:rPr lang="de-DE" sz="1600" dirty="0">
+                <a:solidFill>
+                  <a:schemeClr val="tx1"/>
+                </a:solidFill>
+                <a:latin typeface="Arial" panose="020B0604020202020204" pitchFamily="34" charset="0"/>
+                <a:cs typeface="Arial" panose="020B0604020202020204" pitchFamily="34" charset="0"/>
+              </a:rPr>
+              <a:t>Keyword </a:t>
+            </a:r>
+            <a:r>
+              <a:rPr lang="de-DE" sz="1600" dirty="0" err="1">
+                <a:solidFill>
+                  <a:schemeClr val="tx1"/>
+                </a:solidFill>
+                <a:latin typeface="Arial" panose="020B0604020202020204" pitchFamily="34" charset="0"/>
+                <a:cs typeface="Arial" panose="020B0604020202020204" pitchFamily="34" charset="0"/>
+              </a:rPr>
+              <a:t>lists</a:t>
+            </a:r>
+            <a:endParaRPr lang="en-US" sz="1600" dirty="0">
+              <a:solidFill>
+                <a:schemeClr val="tx1"/>
+              </a:solidFill>
+              <a:latin typeface="Arial" panose="020B0604020202020204" pitchFamily="34" charset="0"/>
+              <a:cs typeface="Arial" panose="020B0604020202020204" pitchFamily="34" charset="0"/>
+            </a:endParaRPr>
+          </a:p>
+        </p:txBody>
+      </p:sp>
+      <p:sp>
+        <p:nvSpPr>
+          <p:cNvPr id="20" name="Rechteck 19">
+            <a:extLst>
+              <a:ext uri="{FF2B5EF4-FFF2-40B4-BE49-F238E27FC236}">
+                <a16:creationId xmlns:a16="http://schemas.microsoft.com/office/drawing/2014/main" id="{A88FFAF8-2BD4-6D93-5808-54E0FEB949CF}"/>
+              </a:ext>
+            </a:extLst>
+          </p:cNvPr>
+          <p:cNvSpPr/>
+          <p:nvPr/>
+        </p:nvSpPr>
+        <p:spPr>
+          <a:xfrm>
+            <a:off x="3942307" y="1714416"/>
+            <a:ext cx="1314893" cy="535800"/>
+          </a:xfrm>
+          <a:prstGeom prst="rect">
+            <a:avLst/>
+          </a:prstGeom>
+          <a:noFill/>
+          <a:ln w="19050">
+            <a:solidFill>
+              <a:schemeClr val="tx1"/>
+            </a:solidFill>
+          </a:ln>
+        </p:spPr>
+        <p:style>
+          <a:lnRef idx="2">
+            <a:schemeClr val="accent1">
+              <a:shade val="15000"/>
+            </a:schemeClr>
+          </a:lnRef>
+          <a:fillRef idx="1">
+            <a:schemeClr val="accent1"/>
+          </a:fillRef>
+          <a:effectRef idx="0">
+            <a:schemeClr val="accent1"/>
+          </a:effectRef>
+          <a:fontRef idx="minor">
+            <a:schemeClr val="lt1"/>
+          </a:fontRef>
+        </p:style>
+        <p:txBody>
+          <a:bodyPr rtlCol="0" anchor="ctr"/>
+          <a:lstStyle/>
+          <a:p>
+            <a:pPr algn="ctr"/>
+            <a:r>
+              <a:rPr lang="de-DE" sz="1600" dirty="0">
+                <a:solidFill>
+                  <a:schemeClr val="tx1"/>
+                </a:solidFill>
+                <a:latin typeface="Arial" panose="020B0604020202020204" pitchFamily="34" charset="0"/>
+                <a:cs typeface="Arial" panose="020B0604020202020204" pitchFamily="34" charset="0"/>
+              </a:rPr>
+              <a:t>Rule-</a:t>
+            </a:r>
+            <a:r>
+              <a:rPr lang="de-DE" sz="1600" dirty="0" err="1">
+                <a:solidFill>
+                  <a:schemeClr val="tx1"/>
+                </a:solidFill>
+                <a:latin typeface="Arial" panose="020B0604020202020204" pitchFamily="34" charset="0"/>
+                <a:cs typeface="Arial" panose="020B0604020202020204" pitchFamily="34" charset="0"/>
+              </a:rPr>
+              <a:t>based</a:t>
+            </a:r>
+            <a:endParaRPr lang="en-US" sz="1600" dirty="0">
+              <a:solidFill>
+                <a:schemeClr val="tx1"/>
+              </a:solidFill>
+              <a:latin typeface="Arial" panose="020B0604020202020204" pitchFamily="34" charset="0"/>
+              <a:cs typeface="Arial" panose="020B0604020202020204" pitchFamily="34" charset="0"/>
+            </a:endParaRPr>
+          </a:p>
+        </p:txBody>
+      </p:sp>
+      <p:sp>
+        <p:nvSpPr>
+          <p:cNvPr id="21" name="Flussdiagramm: Dokument 20">
+            <a:extLst>
+              <a:ext uri="{FF2B5EF4-FFF2-40B4-BE49-F238E27FC236}">
+                <a16:creationId xmlns:a16="http://schemas.microsoft.com/office/drawing/2014/main" id="{75B269C8-6CD3-1533-4289-9DD449AEAB6A}"/>
+              </a:ext>
+            </a:extLst>
+          </p:cNvPr>
+          <p:cNvSpPr/>
+          <p:nvPr/>
+        </p:nvSpPr>
+        <p:spPr>
+          <a:xfrm>
+            <a:off x="5770663" y="1372610"/>
+            <a:ext cx="1403497" cy="1254642"/>
+          </a:xfrm>
+          <a:prstGeom prst="flowChartDocument">
+            <a:avLst/>
+          </a:prstGeom>
+          <a:noFill/>
+          <a:ln w="19050"/>
+        </p:spPr>
+        <p:style>
+          <a:lnRef idx="2">
+            <a:schemeClr val="accent1">
+              <a:shade val="15000"/>
+            </a:schemeClr>
+          </a:lnRef>
+          <a:fillRef idx="1">
+            <a:schemeClr val="accent1"/>
+          </a:fillRef>
+          <a:effectRef idx="0">
+            <a:schemeClr val="accent1"/>
+          </a:effectRef>
+          <a:fontRef idx="minor">
+            <a:schemeClr val="lt1"/>
+          </a:fontRef>
+        </p:style>
+        <p:txBody>
+          <a:bodyPr rtlCol="0" anchor="ctr"/>
+          <a:lstStyle/>
+          <a:p>
+            <a:pPr algn="ctr"/>
+            <a:r>
+              <a:rPr lang="de-DE" dirty="0">
+                <a:solidFill>
+                  <a:schemeClr val="tx1"/>
+                </a:solidFill>
+                <a:latin typeface="Arial" panose="020B0604020202020204" pitchFamily="34" charset="0"/>
+                <a:cs typeface="Arial" panose="020B0604020202020204" pitchFamily="34" charset="0"/>
+              </a:rPr>
+              <a:t>Potential FLS</a:t>
+            </a:r>
+            <a:endParaRPr lang="en-US" dirty="0">
+              <a:solidFill>
+                <a:schemeClr val="tx1"/>
+              </a:solidFill>
+              <a:latin typeface="Arial" panose="020B0604020202020204" pitchFamily="34" charset="0"/>
+              <a:cs typeface="Arial" panose="020B0604020202020204" pitchFamily="34" charset="0"/>
+            </a:endParaRPr>
+          </a:p>
+        </p:txBody>
+      </p:sp>
+      <p:sp>
+        <p:nvSpPr>
+          <p:cNvPr id="22" name="Rechteck 21">
+            <a:extLst>
+              <a:ext uri="{FF2B5EF4-FFF2-40B4-BE49-F238E27FC236}">
+                <a16:creationId xmlns:a16="http://schemas.microsoft.com/office/drawing/2014/main" id="{99242699-6F23-3E78-4491-52F166F300E5}"/>
+              </a:ext>
+            </a:extLst>
+          </p:cNvPr>
+          <p:cNvSpPr/>
+          <p:nvPr/>
+        </p:nvSpPr>
+        <p:spPr>
+          <a:xfrm>
+            <a:off x="5770663" y="474680"/>
+            <a:ext cx="1403497" cy="535800"/>
+          </a:xfrm>
+          <a:prstGeom prst="rect">
+            <a:avLst/>
+          </a:prstGeom>
+          <a:noFill/>
+          <a:ln w="19050">
+            <a:solidFill>
+              <a:schemeClr val="tx1"/>
+            </a:solidFill>
+          </a:ln>
+        </p:spPr>
+        <p:style>
+          <a:lnRef idx="2">
+            <a:schemeClr val="accent1">
+              <a:shade val="15000"/>
+            </a:schemeClr>
+          </a:lnRef>
+          <a:fillRef idx="1">
+            <a:schemeClr val="accent1"/>
+          </a:fillRef>
+          <a:effectRef idx="0">
+            <a:schemeClr val="accent1"/>
+          </a:effectRef>
+          <a:fontRef idx="minor">
+            <a:schemeClr val="lt1"/>
+          </a:fontRef>
+        </p:style>
+        <p:txBody>
+          <a:bodyPr rtlCol="0" anchor="ctr"/>
+          <a:lstStyle/>
+          <a:p>
+            <a:pPr algn="ctr"/>
+            <a:r>
+              <a:rPr lang="de-DE" sz="1600" dirty="0">
+                <a:solidFill>
+                  <a:schemeClr val="tx1"/>
+                </a:solidFill>
+                <a:latin typeface="Arial" panose="020B0604020202020204" pitchFamily="34" charset="0"/>
+                <a:cs typeface="Arial" panose="020B0604020202020204" pitchFamily="34" charset="0"/>
+              </a:rPr>
+              <a:t>FLS </a:t>
+            </a:r>
+            <a:r>
+              <a:rPr lang="de-DE" sz="1600" dirty="0" err="1">
+                <a:solidFill>
+                  <a:schemeClr val="tx1"/>
+                </a:solidFill>
+                <a:latin typeface="Arial" panose="020B0604020202020204" pitchFamily="34" charset="0"/>
+                <a:cs typeface="Arial" panose="020B0604020202020204" pitchFamily="34" charset="0"/>
+              </a:rPr>
+              <a:t>classifier</a:t>
+            </a:r>
+            <a:endParaRPr lang="en-US" sz="1600" dirty="0">
+              <a:solidFill>
+                <a:schemeClr val="tx1"/>
+              </a:solidFill>
+              <a:latin typeface="Arial" panose="020B0604020202020204" pitchFamily="34" charset="0"/>
+              <a:cs typeface="Arial" panose="020B0604020202020204" pitchFamily="34" charset="0"/>
+            </a:endParaRPr>
+          </a:p>
+        </p:txBody>
+      </p:sp>
+      <p:sp>
+        <p:nvSpPr>
+          <p:cNvPr id="23" name="Zylinder 22">
+            <a:extLst>
+              <a:ext uri="{FF2B5EF4-FFF2-40B4-BE49-F238E27FC236}">
+                <a16:creationId xmlns:a16="http://schemas.microsoft.com/office/drawing/2014/main" id="{762013C6-1214-B329-6DF2-08ECC160DAA5}"/>
+              </a:ext>
+            </a:extLst>
+          </p:cNvPr>
+          <p:cNvSpPr/>
+          <p:nvPr/>
+        </p:nvSpPr>
+        <p:spPr>
+          <a:xfrm>
+            <a:off x="10892454" y="1203940"/>
+            <a:ext cx="894034" cy="1254642"/>
+          </a:xfrm>
+          <a:prstGeom prst="can">
+            <a:avLst/>
+          </a:prstGeom>
+          <a:noFill/>
+          <a:ln w="19050"/>
+        </p:spPr>
+        <p:style>
+          <a:lnRef idx="2">
+            <a:schemeClr val="accent1">
+              <a:shade val="15000"/>
+            </a:schemeClr>
+          </a:lnRef>
+          <a:fillRef idx="1">
+            <a:schemeClr val="accent1"/>
+          </a:fillRef>
+          <a:effectRef idx="0">
+            <a:schemeClr val="accent1"/>
+          </a:effectRef>
+          <a:fontRef idx="minor">
+            <a:schemeClr val="lt1"/>
+          </a:fontRef>
+        </p:style>
+        <p:txBody>
+          <a:bodyPr rtlCol="0" anchor="ctr"/>
+          <a:lstStyle/>
+          <a:p>
+            <a:pPr algn="ctr"/>
+            <a:r>
+              <a:rPr lang="de-DE" sz="1600" dirty="0">
+                <a:solidFill>
+                  <a:schemeClr val="tx1"/>
+                </a:solidFill>
+                <a:latin typeface="Arial" panose="020B0604020202020204" pitchFamily="34" charset="0"/>
+                <a:cs typeface="Arial" panose="020B0604020202020204" pitchFamily="34" charset="0"/>
+              </a:rPr>
+              <a:t>FLS + </a:t>
+            </a:r>
+            <a:r>
+              <a:rPr lang="de-DE" sz="1600" dirty="0" err="1">
+                <a:solidFill>
+                  <a:schemeClr val="tx1"/>
+                </a:solidFill>
+                <a:latin typeface="Arial" panose="020B0604020202020204" pitchFamily="34" charset="0"/>
+                <a:cs typeface="Arial" panose="020B0604020202020204" pitchFamily="34" charset="0"/>
+              </a:rPr>
+              <a:t>metrics</a:t>
+            </a:r>
+            <a:endParaRPr lang="en-US" sz="1600" dirty="0">
+              <a:solidFill>
+                <a:schemeClr val="tx1"/>
+              </a:solidFill>
+              <a:latin typeface="Arial" panose="020B0604020202020204" pitchFamily="34" charset="0"/>
+              <a:cs typeface="Arial" panose="020B0604020202020204" pitchFamily="34" charset="0"/>
+            </a:endParaRPr>
+          </a:p>
+        </p:txBody>
+      </p:sp>
+      <p:sp>
+        <p:nvSpPr>
+          <p:cNvPr id="2" name="Flussdiagramm: Mehrere Dokumente 1">
+            <a:extLst>
+              <a:ext uri="{FF2B5EF4-FFF2-40B4-BE49-F238E27FC236}">
+                <a16:creationId xmlns:a16="http://schemas.microsoft.com/office/drawing/2014/main" id="{DB7E1C6E-D0CD-A825-9CF5-4F6FCBB49978}"/>
+              </a:ext>
+            </a:extLst>
+          </p:cNvPr>
+          <p:cNvSpPr/>
+          <p:nvPr/>
+        </p:nvSpPr>
+        <p:spPr>
+          <a:xfrm>
+            <a:off x="9102203" y="2463834"/>
+            <a:ext cx="1314893" cy="1576076"/>
+          </a:xfrm>
+          <a:prstGeom prst="flowChartMultidocument">
+            <a:avLst/>
+          </a:prstGeom>
+          <a:noFill/>
+          <a:ln w="19050"/>
+        </p:spPr>
+        <p:style>
+          <a:lnRef idx="2">
+            <a:schemeClr val="accent1">
+              <a:shade val="15000"/>
+            </a:schemeClr>
+          </a:lnRef>
+          <a:fillRef idx="1">
+            <a:schemeClr val="accent1"/>
+          </a:fillRef>
+          <a:effectRef idx="0">
+            <a:schemeClr val="accent1"/>
+          </a:effectRef>
+          <a:fontRef idx="minor">
+            <a:schemeClr val="lt1"/>
+          </a:fontRef>
+        </p:style>
+        <p:txBody>
+          <a:bodyPr rtlCol="0" anchor="ctr"/>
+          <a:lstStyle/>
+          <a:p>
+            <a:pPr algn="ctr"/>
+            <a:r>
+              <a:rPr lang="de-DE" sz="1400" dirty="0">
+                <a:solidFill>
+                  <a:schemeClr val="tx1"/>
+                </a:solidFill>
+                <a:latin typeface="Arial" panose="020B0604020202020204" pitchFamily="34" charset="0"/>
+                <a:cs typeface="Arial" panose="020B0604020202020204" pitchFamily="34" charset="0"/>
+              </a:rPr>
+              <a:t>True </a:t>
+            </a:r>
+            <a:r>
+              <a:rPr lang="de-DE" sz="1400" dirty="0" err="1">
+                <a:solidFill>
+                  <a:schemeClr val="tx1"/>
+                </a:solidFill>
+                <a:latin typeface="Arial" panose="020B0604020202020204" pitchFamily="34" charset="0"/>
+                <a:cs typeface="Arial" panose="020B0604020202020204" pitchFamily="34" charset="0"/>
+              </a:rPr>
+              <a:t>values</a:t>
+            </a:r>
+            <a:r>
+              <a:rPr lang="de-DE" sz="1400" dirty="0">
+                <a:solidFill>
+                  <a:schemeClr val="tx1"/>
+                </a:solidFill>
+                <a:latin typeface="Arial" panose="020B0604020202020204" pitchFamily="34" charset="0"/>
+                <a:cs typeface="Arial" panose="020B0604020202020204" pitchFamily="34" charset="0"/>
+              </a:rPr>
+              <a:t> </a:t>
+            </a:r>
+            <a:r>
+              <a:rPr lang="de-DE" sz="1400" dirty="0" err="1">
+                <a:solidFill>
+                  <a:schemeClr val="tx1"/>
+                </a:solidFill>
+                <a:latin typeface="Arial" panose="020B0604020202020204" pitchFamily="34" charset="0"/>
+                <a:cs typeface="Arial" panose="020B0604020202020204" pitchFamily="34" charset="0"/>
+              </a:rPr>
+              <a:t>of</a:t>
+            </a:r>
+            <a:r>
+              <a:rPr lang="de-DE" sz="1400" dirty="0">
+                <a:solidFill>
+                  <a:schemeClr val="tx1"/>
+                </a:solidFill>
+                <a:latin typeface="Arial" panose="020B0604020202020204" pitchFamily="34" charset="0"/>
+                <a:cs typeface="Arial" panose="020B0604020202020204" pitchFamily="34" charset="0"/>
+              </a:rPr>
+              <a:t> </a:t>
+            </a:r>
+            <a:r>
+              <a:rPr lang="de-DE" sz="1400" dirty="0" err="1">
+                <a:solidFill>
+                  <a:schemeClr val="tx1"/>
+                </a:solidFill>
+                <a:latin typeface="Arial" panose="020B0604020202020204" pitchFamily="34" charset="0"/>
+                <a:cs typeface="Arial" panose="020B0604020202020204" pitchFamily="34" charset="0"/>
+              </a:rPr>
+              <a:t>financial</a:t>
+            </a:r>
+            <a:r>
+              <a:rPr lang="de-DE" sz="1400" dirty="0">
+                <a:solidFill>
+                  <a:schemeClr val="tx1"/>
+                </a:solidFill>
+                <a:latin typeface="Arial" panose="020B0604020202020204" pitchFamily="34" charset="0"/>
+                <a:cs typeface="Arial" panose="020B0604020202020204" pitchFamily="34" charset="0"/>
+              </a:rPr>
+              <a:t> </a:t>
+            </a:r>
+            <a:r>
+              <a:rPr lang="de-DE" sz="1400" dirty="0" err="1">
+                <a:solidFill>
+                  <a:schemeClr val="tx1"/>
+                </a:solidFill>
+                <a:latin typeface="Arial" panose="020B0604020202020204" pitchFamily="34" charset="0"/>
+                <a:cs typeface="Arial" panose="020B0604020202020204" pitchFamily="34" charset="0"/>
+              </a:rPr>
+              <a:t>metrics</a:t>
+            </a:r>
+            <a:endParaRPr lang="en-US" sz="1400" dirty="0">
+              <a:solidFill>
+                <a:schemeClr val="tx1"/>
+              </a:solidFill>
+              <a:latin typeface="Arial" panose="020B0604020202020204" pitchFamily="34" charset="0"/>
+              <a:cs typeface="Arial" panose="020B0604020202020204" pitchFamily="34" charset="0"/>
+            </a:endParaRPr>
+          </a:p>
+          <a:p>
+            <a:pPr algn="ctr"/>
+            <a:endParaRPr lang="en-US" sz="1400" dirty="0">
+              <a:solidFill>
+                <a:schemeClr val="tx1"/>
+              </a:solidFill>
+              <a:latin typeface="Arial" panose="020B0604020202020204" pitchFamily="34" charset="0"/>
+              <a:cs typeface="Arial" panose="020B0604020202020204" pitchFamily="34" charset="0"/>
+            </a:endParaRPr>
+          </a:p>
+        </p:txBody>
+      </p:sp>
+      <p:sp>
+        <p:nvSpPr>
+          <p:cNvPr id="3" name="Flussdiagramm: Dokument 2">
+            <a:extLst>
+              <a:ext uri="{FF2B5EF4-FFF2-40B4-BE49-F238E27FC236}">
+                <a16:creationId xmlns:a16="http://schemas.microsoft.com/office/drawing/2014/main" id="{36638958-CAB4-057D-EFD0-9990FE9DE217}"/>
+              </a:ext>
+            </a:extLst>
+          </p:cNvPr>
+          <p:cNvSpPr/>
+          <p:nvPr/>
+        </p:nvSpPr>
+        <p:spPr>
+          <a:xfrm>
+            <a:off x="7705355" y="127435"/>
+            <a:ext cx="1403497" cy="1254642"/>
+          </a:xfrm>
+          <a:prstGeom prst="flowChartDocument">
+            <a:avLst/>
+          </a:prstGeom>
+          <a:noFill/>
+          <a:ln w="19050"/>
+        </p:spPr>
+        <p:style>
+          <a:lnRef idx="2">
+            <a:schemeClr val="accent1">
+              <a:shade val="15000"/>
+            </a:schemeClr>
+          </a:lnRef>
+          <a:fillRef idx="1">
+            <a:schemeClr val="accent1"/>
+          </a:fillRef>
+          <a:effectRef idx="0">
+            <a:schemeClr val="accent1"/>
+          </a:effectRef>
+          <a:fontRef idx="minor">
+            <a:schemeClr val="lt1"/>
+          </a:fontRef>
+        </p:style>
+        <p:txBody>
+          <a:bodyPr rtlCol="0" anchor="ctr"/>
+          <a:lstStyle/>
+          <a:p>
+            <a:pPr algn="ctr"/>
+            <a:r>
+              <a:rPr lang="de-DE" dirty="0">
+                <a:solidFill>
+                  <a:schemeClr val="tx1"/>
+                </a:solidFill>
+                <a:latin typeface="Arial" panose="020B0604020202020204" pitchFamily="34" charset="0"/>
+                <a:cs typeface="Arial" panose="020B0604020202020204" pitchFamily="34" charset="0"/>
+              </a:rPr>
+              <a:t>List </a:t>
+            </a:r>
+            <a:r>
+              <a:rPr lang="de-DE" dirty="0" err="1">
+                <a:solidFill>
+                  <a:schemeClr val="tx1"/>
+                </a:solidFill>
+                <a:latin typeface="Arial" panose="020B0604020202020204" pitchFamily="34" charset="0"/>
+                <a:cs typeface="Arial" panose="020B0604020202020204" pitchFamily="34" charset="0"/>
+              </a:rPr>
+              <a:t>of</a:t>
+            </a:r>
+            <a:r>
+              <a:rPr lang="de-DE" dirty="0">
+                <a:solidFill>
+                  <a:schemeClr val="tx1"/>
+                </a:solidFill>
+                <a:latin typeface="Arial" panose="020B0604020202020204" pitchFamily="34" charset="0"/>
+                <a:cs typeface="Arial" panose="020B0604020202020204" pitchFamily="34" charset="0"/>
+              </a:rPr>
+              <a:t> FLS</a:t>
+            </a:r>
+            <a:endParaRPr lang="en-US" dirty="0">
+              <a:solidFill>
+                <a:schemeClr val="tx1"/>
+              </a:solidFill>
+              <a:latin typeface="Arial" panose="020B0604020202020204" pitchFamily="34" charset="0"/>
+              <a:cs typeface="Arial" panose="020B0604020202020204" pitchFamily="34" charset="0"/>
+            </a:endParaRPr>
+          </a:p>
+        </p:txBody>
+      </p:sp>
+      <p:sp>
+        <p:nvSpPr>
+          <p:cNvPr id="4" name="Rechteck 3">
+            <a:extLst>
+              <a:ext uri="{FF2B5EF4-FFF2-40B4-BE49-F238E27FC236}">
+                <a16:creationId xmlns:a16="http://schemas.microsoft.com/office/drawing/2014/main" id="{26D8301B-7307-AD93-8FC0-FD72E2C6E545}"/>
+              </a:ext>
+            </a:extLst>
+          </p:cNvPr>
+          <p:cNvSpPr/>
+          <p:nvPr/>
+        </p:nvSpPr>
+        <p:spPr>
+          <a:xfrm>
+            <a:off x="9202810" y="1555679"/>
+            <a:ext cx="1314893" cy="535800"/>
+          </a:xfrm>
+          <a:prstGeom prst="rect">
+            <a:avLst/>
+          </a:prstGeom>
+          <a:noFill/>
+          <a:ln w="19050">
+            <a:solidFill>
+              <a:schemeClr val="tx1"/>
+            </a:solidFill>
+          </a:ln>
+        </p:spPr>
+        <p:style>
+          <a:lnRef idx="2">
+            <a:schemeClr val="accent1">
+              <a:shade val="15000"/>
+            </a:schemeClr>
+          </a:lnRef>
+          <a:fillRef idx="1">
+            <a:schemeClr val="accent1"/>
+          </a:fillRef>
+          <a:effectRef idx="0">
+            <a:schemeClr val="accent1"/>
+          </a:effectRef>
+          <a:fontRef idx="minor">
+            <a:schemeClr val="lt1"/>
+          </a:fontRef>
+        </p:style>
+        <p:txBody>
+          <a:bodyPr rtlCol="0" anchor="ctr"/>
+          <a:lstStyle/>
+          <a:p>
+            <a:pPr algn="ctr"/>
+            <a:r>
+              <a:rPr lang="de-DE" sz="1600" dirty="0">
+                <a:solidFill>
+                  <a:schemeClr val="tx1"/>
+                </a:solidFill>
+                <a:latin typeface="Arial" panose="020B0604020202020204" pitchFamily="34" charset="0"/>
+                <a:cs typeface="Arial" panose="020B0604020202020204" pitchFamily="34" charset="0"/>
+              </a:rPr>
+              <a:t>Data </a:t>
+            </a:r>
+            <a:r>
+              <a:rPr lang="de-DE" sz="1600" dirty="0" err="1">
+                <a:solidFill>
+                  <a:schemeClr val="tx1"/>
+                </a:solidFill>
+                <a:latin typeface="Arial" panose="020B0604020202020204" pitchFamily="34" charset="0"/>
+                <a:cs typeface="Arial" panose="020B0604020202020204" pitchFamily="34" charset="0"/>
+              </a:rPr>
+              <a:t>integration</a:t>
+            </a:r>
+            <a:endParaRPr lang="en-US" sz="1600" dirty="0">
+              <a:solidFill>
+                <a:schemeClr val="tx1"/>
+              </a:solidFill>
+              <a:latin typeface="Arial" panose="020B0604020202020204" pitchFamily="34" charset="0"/>
+              <a:cs typeface="Arial" panose="020B0604020202020204" pitchFamily="34" charset="0"/>
+            </a:endParaRPr>
+          </a:p>
+        </p:txBody>
+      </p:sp>
+      <p:sp>
+        <p:nvSpPr>
+          <p:cNvPr id="5" name="Rechteck 4">
+            <a:extLst>
+              <a:ext uri="{FF2B5EF4-FFF2-40B4-BE49-F238E27FC236}">
+                <a16:creationId xmlns:a16="http://schemas.microsoft.com/office/drawing/2014/main" id="{4EE13403-2D41-96F2-E718-9ECE87686F12}"/>
+              </a:ext>
+            </a:extLst>
+          </p:cNvPr>
+          <p:cNvSpPr/>
+          <p:nvPr/>
+        </p:nvSpPr>
+        <p:spPr>
+          <a:xfrm>
+            <a:off x="10682024" y="2805292"/>
+            <a:ext cx="1314893" cy="535800"/>
+          </a:xfrm>
+          <a:prstGeom prst="rect">
+            <a:avLst/>
+          </a:prstGeom>
+          <a:noFill/>
+          <a:ln w="19050">
+            <a:solidFill>
+              <a:schemeClr val="tx1"/>
+            </a:solidFill>
+          </a:ln>
+        </p:spPr>
+        <p:style>
+          <a:lnRef idx="2">
+            <a:schemeClr val="accent1">
+              <a:shade val="15000"/>
+            </a:schemeClr>
+          </a:lnRef>
+          <a:fillRef idx="1">
+            <a:schemeClr val="accent1"/>
+          </a:fillRef>
+          <a:effectRef idx="0">
+            <a:schemeClr val="accent1"/>
+          </a:effectRef>
+          <a:fontRef idx="minor">
+            <a:schemeClr val="lt1"/>
+          </a:fontRef>
+        </p:style>
+        <p:txBody>
+          <a:bodyPr rtlCol="0" anchor="ctr"/>
+          <a:lstStyle/>
+          <a:p>
+            <a:pPr algn="ctr"/>
+            <a:r>
+              <a:rPr lang="de-DE" sz="1400" dirty="0" err="1">
+                <a:solidFill>
+                  <a:schemeClr val="tx1"/>
+                </a:solidFill>
+                <a:latin typeface="Arial" panose="020B0604020202020204" pitchFamily="34" charset="0"/>
+                <a:cs typeface="Arial" panose="020B0604020202020204" pitchFamily="34" charset="0"/>
+              </a:rPr>
+              <a:t>Predicting</a:t>
+            </a:r>
+            <a:r>
+              <a:rPr lang="de-DE" sz="1400" dirty="0">
+                <a:solidFill>
+                  <a:schemeClr val="tx1"/>
+                </a:solidFill>
+                <a:latin typeface="Arial" panose="020B0604020202020204" pitchFamily="34" charset="0"/>
+                <a:cs typeface="Arial" panose="020B0604020202020204" pitchFamily="34" charset="0"/>
+              </a:rPr>
+              <a:t> </a:t>
+            </a:r>
+            <a:r>
+              <a:rPr lang="de-DE" sz="1400" dirty="0" err="1">
+                <a:solidFill>
+                  <a:schemeClr val="tx1"/>
+                </a:solidFill>
+                <a:latin typeface="Arial" panose="020B0604020202020204" pitchFamily="34" charset="0"/>
+                <a:cs typeface="Arial" panose="020B0604020202020204" pitchFamily="34" charset="0"/>
+              </a:rPr>
+              <a:t>model</a:t>
+            </a:r>
+            <a:endParaRPr lang="en-US" sz="1400" dirty="0">
+              <a:solidFill>
+                <a:schemeClr val="tx1"/>
+              </a:solidFill>
+              <a:latin typeface="Arial" panose="020B0604020202020204" pitchFamily="34" charset="0"/>
+              <a:cs typeface="Arial" panose="020B0604020202020204" pitchFamily="34" charset="0"/>
+            </a:endParaRPr>
+          </a:p>
+        </p:txBody>
+      </p:sp>
+      <p:sp>
+        <p:nvSpPr>
+          <p:cNvPr id="6" name="Flussdiagramm: Dokument 5">
+            <a:extLst>
+              <a:ext uri="{FF2B5EF4-FFF2-40B4-BE49-F238E27FC236}">
+                <a16:creationId xmlns:a16="http://schemas.microsoft.com/office/drawing/2014/main" id="{22AAC1BB-D287-6768-6EBA-D49907877657}"/>
+              </a:ext>
+            </a:extLst>
+          </p:cNvPr>
+          <p:cNvSpPr/>
+          <p:nvPr/>
+        </p:nvSpPr>
+        <p:spPr>
+          <a:xfrm>
+            <a:off x="10599863" y="3713224"/>
+            <a:ext cx="1479214" cy="1254642"/>
+          </a:xfrm>
+          <a:prstGeom prst="flowChartDocument">
+            <a:avLst/>
+          </a:prstGeom>
+          <a:noFill/>
+          <a:ln w="38100"/>
+        </p:spPr>
+        <p:style>
+          <a:lnRef idx="2">
+            <a:schemeClr val="accent1">
+              <a:shade val="15000"/>
+            </a:schemeClr>
+          </a:lnRef>
+          <a:fillRef idx="1">
+            <a:schemeClr val="accent1"/>
+          </a:fillRef>
+          <a:effectRef idx="0">
+            <a:schemeClr val="accent1"/>
+          </a:effectRef>
+          <a:fontRef idx="minor">
+            <a:schemeClr val="lt1"/>
+          </a:fontRef>
+        </p:style>
+        <p:txBody>
+          <a:bodyPr rtlCol="0" anchor="ctr"/>
+          <a:lstStyle/>
+          <a:p>
+            <a:pPr algn="ctr"/>
+            <a:r>
+              <a:rPr lang="de-DE" sz="1600" b="1" dirty="0">
+                <a:solidFill>
+                  <a:schemeClr val="tx1"/>
+                </a:solidFill>
+                <a:latin typeface="Arial" panose="020B0604020202020204" pitchFamily="34" charset="0"/>
+                <a:cs typeface="Arial" panose="020B0604020202020204" pitchFamily="34" charset="0"/>
+              </a:rPr>
+              <a:t>Company </a:t>
+            </a:r>
+            <a:r>
+              <a:rPr lang="de-DE" sz="1600" b="1" dirty="0" err="1">
+                <a:solidFill>
+                  <a:schemeClr val="tx1"/>
+                </a:solidFill>
+                <a:latin typeface="Arial" panose="020B0604020202020204" pitchFamily="34" charset="0"/>
+                <a:cs typeface="Arial" panose="020B0604020202020204" pitchFamily="34" charset="0"/>
+              </a:rPr>
+              <a:t>performance</a:t>
+            </a:r>
+            <a:r>
+              <a:rPr lang="de-DE" sz="1600" b="1" dirty="0">
+                <a:solidFill>
+                  <a:schemeClr val="tx1"/>
+                </a:solidFill>
+                <a:latin typeface="Arial" panose="020B0604020202020204" pitchFamily="34" charset="0"/>
+                <a:cs typeface="Arial" panose="020B0604020202020204" pitchFamily="34" charset="0"/>
+              </a:rPr>
+              <a:t> </a:t>
+            </a:r>
+            <a:r>
+              <a:rPr lang="de-DE" sz="1600" b="1" dirty="0" err="1">
+                <a:solidFill>
+                  <a:schemeClr val="tx1"/>
+                </a:solidFill>
+                <a:latin typeface="Arial" panose="020B0604020202020204" pitchFamily="34" charset="0"/>
+                <a:cs typeface="Arial" panose="020B0604020202020204" pitchFamily="34" charset="0"/>
+              </a:rPr>
+              <a:t>prediction</a:t>
+            </a:r>
+            <a:endParaRPr lang="en-US" sz="1600" b="1" dirty="0">
+              <a:solidFill>
+                <a:schemeClr val="tx1"/>
+              </a:solidFill>
+              <a:latin typeface="Arial" panose="020B0604020202020204" pitchFamily="34" charset="0"/>
+              <a:cs typeface="Arial" panose="020B0604020202020204" pitchFamily="34" charset="0"/>
+            </a:endParaRPr>
+          </a:p>
+        </p:txBody>
+      </p:sp>
+      <p:sp>
+        <p:nvSpPr>
+          <p:cNvPr id="24" name="Flussdiagramm: Mehrere Dokumente 23">
+            <a:extLst>
+              <a:ext uri="{FF2B5EF4-FFF2-40B4-BE49-F238E27FC236}">
+                <a16:creationId xmlns:a16="http://schemas.microsoft.com/office/drawing/2014/main" id="{5BDF788A-66C7-7123-E734-D3312E77A599}"/>
+              </a:ext>
+            </a:extLst>
+          </p:cNvPr>
+          <p:cNvSpPr/>
+          <p:nvPr/>
+        </p:nvSpPr>
+        <p:spPr>
+          <a:xfrm>
+            <a:off x="357352" y="-300818"/>
+            <a:ext cx="1504958" cy="1775323"/>
+          </a:xfrm>
+          <a:prstGeom prst="flowChartMultidocument">
+            <a:avLst/>
+          </a:prstGeom>
+          <a:noFill/>
+          <a:ln w="19050"/>
+        </p:spPr>
+        <p:style>
+          <a:lnRef idx="2">
+            <a:schemeClr val="accent1">
+              <a:shade val="15000"/>
+            </a:schemeClr>
+          </a:lnRef>
+          <a:fillRef idx="1">
+            <a:schemeClr val="accent1"/>
+          </a:fillRef>
+          <a:effectRef idx="0">
+            <a:schemeClr val="accent1"/>
+          </a:effectRef>
+          <a:fontRef idx="minor">
+            <a:schemeClr val="lt1"/>
+          </a:fontRef>
+        </p:style>
+        <p:txBody>
+          <a:bodyPr rtlCol="0" anchor="ctr"/>
+          <a:lstStyle/>
+          <a:p>
+            <a:pPr algn="ctr"/>
+            <a:r>
+              <a:rPr lang="de-DE" sz="1600" dirty="0" err="1">
+                <a:solidFill>
+                  <a:schemeClr val="tx1"/>
+                </a:solidFill>
+                <a:latin typeface="Arial" panose="020B0604020202020204" pitchFamily="34" charset="0"/>
+                <a:cs typeface="Arial" panose="020B0604020202020204" pitchFamily="34" charset="0"/>
+              </a:rPr>
+              <a:t>Extracted</a:t>
+            </a:r>
+            <a:r>
+              <a:rPr lang="de-DE" sz="1600" dirty="0">
+                <a:solidFill>
+                  <a:schemeClr val="tx1"/>
+                </a:solidFill>
+                <a:latin typeface="Arial" panose="020B0604020202020204" pitchFamily="34" charset="0"/>
+                <a:cs typeface="Arial" panose="020B0604020202020204" pitchFamily="34" charset="0"/>
+              </a:rPr>
+              <a:t> 10-K </a:t>
+            </a:r>
+            <a:r>
+              <a:rPr lang="de-DE" sz="1600" dirty="0" err="1">
+                <a:solidFill>
+                  <a:schemeClr val="tx1"/>
+                </a:solidFill>
+                <a:latin typeface="Arial" panose="020B0604020202020204" pitchFamily="34" charset="0"/>
+                <a:cs typeface="Arial" panose="020B0604020202020204" pitchFamily="34" charset="0"/>
+              </a:rPr>
+              <a:t>filings</a:t>
+            </a:r>
+            <a:r>
+              <a:rPr lang="de-DE" sz="1600" dirty="0">
+                <a:solidFill>
+                  <a:schemeClr val="tx1"/>
+                </a:solidFill>
+                <a:latin typeface="Arial" panose="020B0604020202020204" pitchFamily="34" charset="0"/>
+                <a:cs typeface="Arial" panose="020B0604020202020204" pitchFamily="34" charset="0"/>
+              </a:rPr>
+              <a:t> (Items 1A, 7 and 7A)</a:t>
+            </a:r>
+            <a:endParaRPr lang="en-US" sz="1600" dirty="0">
+              <a:solidFill>
+                <a:schemeClr val="tx1"/>
+              </a:solidFill>
+              <a:latin typeface="Arial" panose="020B0604020202020204" pitchFamily="34" charset="0"/>
+              <a:cs typeface="Arial" panose="020B0604020202020204" pitchFamily="34" charset="0"/>
+            </a:endParaRPr>
+          </a:p>
+        </p:txBody>
+      </p:sp>
+      <p:cxnSp>
+        <p:nvCxnSpPr>
+          <p:cNvPr id="26" name="Gerade Verbindung mit Pfeil 25">
+            <a:extLst>
+              <a:ext uri="{FF2B5EF4-FFF2-40B4-BE49-F238E27FC236}">
+                <a16:creationId xmlns:a16="http://schemas.microsoft.com/office/drawing/2014/main" id="{9CD62A8F-4461-C167-D068-D998032D7341}"/>
+              </a:ext>
+            </a:extLst>
+          </p:cNvPr>
+          <p:cNvCxnSpPr>
+            <a:cxnSpLocks/>
+            <a:stCxn id="24" idx="2"/>
+            <a:endCxn id="17" idx="0"/>
+          </p:cNvCxnSpPr>
+          <p:nvPr/>
+        </p:nvCxnSpPr>
+        <p:spPr>
+          <a:xfrm>
+            <a:off x="1005181" y="1407273"/>
+            <a:ext cx="9619" cy="307143"/>
+          </a:xfrm>
+          <a:prstGeom prst="straightConnector1">
+            <a:avLst/>
+          </a:prstGeom>
+          <a:ln w="19050">
+            <a:solidFill>
+              <a:schemeClr val="tx1"/>
+            </a:solidFill>
+            <a:tailEnd type="triangle"/>
+          </a:ln>
+        </p:spPr>
+        <p:style>
+          <a:lnRef idx="1">
+            <a:schemeClr val="accent1"/>
+          </a:lnRef>
+          <a:fillRef idx="0">
+            <a:schemeClr val="accent1"/>
+          </a:fillRef>
+          <a:effectRef idx="0">
+            <a:schemeClr val="accent1"/>
+          </a:effectRef>
+          <a:fontRef idx="minor">
+            <a:schemeClr val="tx1"/>
+          </a:fontRef>
+        </p:style>
+      </p:cxnSp>
+      <p:cxnSp>
+        <p:nvCxnSpPr>
+          <p:cNvPr id="31" name="Gerade Verbindung mit Pfeil 30">
+            <a:extLst>
+              <a:ext uri="{FF2B5EF4-FFF2-40B4-BE49-F238E27FC236}">
+                <a16:creationId xmlns:a16="http://schemas.microsoft.com/office/drawing/2014/main" id="{A7AAF8BD-88E0-0AA1-9EE2-1963B372D072}"/>
+              </a:ext>
+            </a:extLst>
+          </p:cNvPr>
+          <p:cNvCxnSpPr>
+            <a:cxnSpLocks/>
+            <a:stCxn id="17" idx="3"/>
+            <a:endCxn id="18" idx="1"/>
+          </p:cNvCxnSpPr>
+          <p:nvPr/>
+        </p:nvCxnSpPr>
+        <p:spPr>
+          <a:xfrm>
+            <a:off x="1672246" y="1982316"/>
+            <a:ext cx="468727" cy="0"/>
+          </a:xfrm>
+          <a:prstGeom prst="straightConnector1">
+            <a:avLst/>
+          </a:prstGeom>
+          <a:ln w="19050">
+            <a:solidFill>
+              <a:schemeClr val="tx1"/>
+            </a:solidFill>
+            <a:tailEnd type="triangle"/>
+          </a:ln>
+        </p:spPr>
+        <p:style>
+          <a:lnRef idx="1">
+            <a:schemeClr val="accent1"/>
+          </a:lnRef>
+          <a:fillRef idx="0">
+            <a:schemeClr val="accent1"/>
+          </a:fillRef>
+          <a:effectRef idx="0">
+            <a:schemeClr val="accent1"/>
+          </a:effectRef>
+          <a:fontRef idx="minor">
+            <a:schemeClr val="tx1"/>
+          </a:fontRef>
+        </p:style>
+      </p:cxnSp>
+      <p:cxnSp>
+        <p:nvCxnSpPr>
+          <p:cNvPr id="34" name="Gerade Verbindung mit Pfeil 33">
+            <a:extLst>
+              <a:ext uri="{FF2B5EF4-FFF2-40B4-BE49-F238E27FC236}">
+                <a16:creationId xmlns:a16="http://schemas.microsoft.com/office/drawing/2014/main" id="{B3AB7660-8118-C733-F7AE-F22028725148}"/>
+              </a:ext>
+            </a:extLst>
+          </p:cNvPr>
+          <p:cNvCxnSpPr>
+            <a:cxnSpLocks/>
+            <a:stCxn id="18" idx="3"/>
+            <a:endCxn id="20" idx="1"/>
+          </p:cNvCxnSpPr>
+          <p:nvPr/>
+        </p:nvCxnSpPr>
+        <p:spPr>
+          <a:xfrm>
+            <a:off x="3544470" y="1982316"/>
+            <a:ext cx="397837" cy="0"/>
+          </a:xfrm>
+          <a:prstGeom prst="straightConnector1">
+            <a:avLst/>
+          </a:prstGeom>
+          <a:ln w="19050">
+            <a:solidFill>
+              <a:schemeClr val="tx1"/>
+            </a:solidFill>
+            <a:tailEnd type="triangle"/>
+          </a:ln>
+        </p:spPr>
+        <p:style>
+          <a:lnRef idx="1">
+            <a:schemeClr val="accent1"/>
+          </a:lnRef>
+          <a:fillRef idx="0">
+            <a:schemeClr val="accent1"/>
+          </a:fillRef>
+          <a:effectRef idx="0">
+            <a:schemeClr val="accent1"/>
+          </a:effectRef>
+          <a:fontRef idx="minor">
+            <a:schemeClr val="tx1"/>
+          </a:fontRef>
+        </p:style>
+      </p:cxnSp>
+      <p:cxnSp>
+        <p:nvCxnSpPr>
+          <p:cNvPr id="38" name="Gerade Verbindung mit Pfeil 37">
+            <a:extLst>
+              <a:ext uri="{FF2B5EF4-FFF2-40B4-BE49-F238E27FC236}">
+                <a16:creationId xmlns:a16="http://schemas.microsoft.com/office/drawing/2014/main" id="{F3801B89-4D52-2A5A-E4B2-9698D92AE113}"/>
+              </a:ext>
+            </a:extLst>
+          </p:cNvPr>
+          <p:cNvCxnSpPr>
+            <a:cxnSpLocks/>
+            <a:stCxn id="20" idx="3"/>
+            <a:endCxn id="21" idx="1"/>
+          </p:cNvCxnSpPr>
+          <p:nvPr/>
+        </p:nvCxnSpPr>
+        <p:spPr>
+          <a:xfrm>
+            <a:off x="5257200" y="1982316"/>
+            <a:ext cx="513463" cy="17615"/>
+          </a:xfrm>
+          <a:prstGeom prst="straightConnector1">
+            <a:avLst/>
+          </a:prstGeom>
+          <a:ln w="19050">
+            <a:solidFill>
+              <a:schemeClr val="tx1"/>
+            </a:solidFill>
+            <a:tailEnd type="triangle"/>
+          </a:ln>
+        </p:spPr>
+        <p:style>
+          <a:lnRef idx="1">
+            <a:schemeClr val="accent1"/>
+          </a:lnRef>
+          <a:fillRef idx="0">
+            <a:schemeClr val="accent1"/>
+          </a:fillRef>
+          <a:effectRef idx="0">
+            <a:schemeClr val="accent1"/>
+          </a:effectRef>
+          <a:fontRef idx="minor">
+            <a:schemeClr val="tx1"/>
+          </a:fontRef>
+        </p:style>
+      </p:cxnSp>
+      <p:cxnSp>
+        <p:nvCxnSpPr>
+          <p:cNvPr id="42" name="Gerade Verbindung mit Pfeil 41">
+            <a:extLst>
+              <a:ext uri="{FF2B5EF4-FFF2-40B4-BE49-F238E27FC236}">
+                <a16:creationId xmlns:a16="http://schemas.microsoft.com/office/drawing/2014/main" id="{AD4005BD-C4F9-4878-73F5-D96AC4B235EC}"/>
+              </a:ext>
+            </a:extLst>
+          </p:cNvPr>
+          <p:cNvCxnSpPr>
+            <a:cxnSpLocks/>
+            <a:stCxn id="21" idx="0"/>
+            <a:endCxn id="22" idx="2"/>
+          </p:cNvCxnSpPr>
+          <p:nvPr/>
+        </p:nvCxnSpPr>
+        <p:spPr>
+          <a:xfrm flipV="1">
+            <a:off x="6472412" y="1010480"/>
+            <a:ext cx="0" cy="362130"/>
+          </a:xfrm>
+          <a:prstGeom prst="straightConnector1">
+            <a:avLst/>
+          </a:prstGeom>
+          <a:ln w="19050">
+            <a:solidFill>
+              <a:schemeClr val="tx1"/>
+            </a:solidFill>
+            <a:tailEnd type="triangle"/>
+          </a:ln>
+        </p:spPr>
+        <p:style>
+          <a:lnRef idx="1">
+            <a:schemeClr val="accent1"/>
+          </a:lnRef>
+          <a:fillRef idx="0">
+            <a:schemeClr val="accent1"/>
+          </a:fillRef>
+          <a:effectRef idx="0">
+            <a:schemeClr val="accent1"/>
+          </a:effectRef>
+          <a:fontRef idx="minor">
+            <a:schemeClr val="tx1"/>
+          </a:fontRef>
+        </p:style>
+      </p:cxnSp>
+      <p:cxnSp>
+        <p:nvCxnSpPr>
+          <p:cNvPr id="46" name="Gerade Verbindung mit Pfeil 45">
+            <a:extLst>
+              <a:ext uri="{FF2B5EF4-FFF2-40B4-BE49-F238E27FC236}">
+                <a16:creationId xmlns:a16="http://schemas.microsoft.com/office/drawing/2014/main" id="{9244FE9B-EC59-8702-F965-067224107FFB}"/>
+              </a:ext>
+            </a:extLst>
+          </p:cNvPr>
+          <p:cNvCxnSpPr>
+            <a:cxnSpLocks/>
+            <a:stCxn id="22" idx="3"/>
+            <a:endCxn id="3" idx="1"/>
+          </p:cNvCxnSpPr>
+          <p:nvPr/>
+        </p:nvCxnSpPr>
+        <p:spPr>
+          <a:xfrm>
+            <a:off x="7174160" y="742580"/>
+            <a:ext cx="531195" cy="12176"/>
+          </a:xfrm>
+          <a:prstGeom prst="straightConnector1">
+            <a:avLst/>
+          </a:prstGeom>
+          <a:ln w="19050">
+            <a:solidFill>
+              <a:schemeClr val="tx1"/>
+            </a:solidFill>
+            <a:tailEnd type="triangle"/>
+          </a:ln>
+        </p:spPr>
+        <p:style>
+          <a:lnRef idx="1">
+            <a:schemeClr val="accent1"/>
+          </a:lnRef>
+          <a:fillRef idx="0">
+            <a:schemeClr val="accent1"/>
+          </a:fillRef>
+          <a:effectRef idx="0">
+            <a:schemeClr val="accent1"/>
+          </a:effectRef>
+          <a:fontRef idx="minor">
+            <a:schemeClr val="tx1"/>
+          </a:fontRef>
+        </p:style>
+      </p:cxnSp>
+      <p:cxnSp>
+        <p:nvCxnSpPr>
+          <p:cNvPr id="49" name="Gerade Verbindung mit Pfeil 48">
+            <a:extLst>
+              <a:ext uri="{FF2B5EF4-FFF2-40B4-BE49-F238E27FC236}">
+                <a16:creationId xmlns:a16="http://schemas.microsoft.com/office/drawing/2014/main" id="{842E5C42-BDF9-E308-4BAB-7E3C0402CD66}"/>
+              </a:ext>
+            </a:extLst>
+          </p:cNvPr>
+          <p:cNvCxnSpPr>
+            <a:cxnSpLocks/>
+            <a:stCxn id="3" idx="2"/>
+            <a:endCxn id="4" idx="1"/>
+          </p:cNvCxnSpPr>
+          <p:nvPr/>
+        </p:nvCxnSpPr>
+        <p:spPr>
+          <a:xfrm rot="16200000" flipH="1">
+            <a:off x="8542733" y="1163502"/>
+            <a:ext cx="524448" cy="795706"/>
+          </a:xfrm>
+          <a:prstGeom prst="bentConnector2">
+            <a:avLst/>
+          </a:prstGeom>
+          <a:ln w="19050">
+            <a:solidFill>
+              <a:schemeClr val="tx1"/>
+            </a:solidFill>
+            <a:tailEnd type="triangle"/>
+          </a:ln>
+        </p:spPr>
+        <p:style>
+          <a:lnRef idx="1">
+            <a:schemeClr val="accent1"/>
+          </a:lnRef>
+          <a:fillRef idx="0">
+            <a:schemeClr val="accent1"/>
+          </a:fillRef>
+          <a:effectRef idx="0">
+            <a:schemeClr val="accent1"/>
+          </a:effectRef>
+          <a:fontRef idx="minor">
+            <a:schemeClr val="tx1"/>
+          </a:fontRef>
+        </p:style>
+      </p:cxnSp>
+      <p:cxnSp>
+        <p:nvCxnSpPr>
+          <p:cNvPr id="58" name="Gerade Verbindung mit Pfeil 57">
+            <a:extLst>
+              <a:ext uri="{FF2B5EF4-FFF2-40B4-BE49-F238E27FC236}">
+                <a16:creationId xmlns:a16="http://schemas.microsoft.com/office/drawing/2014/main" id="{0D41B75A-6C38-2618-6284-59CD5694D6DF}"/>
+              </a:ext>
+            </a:extLst>
+          </p:cNvPr>
+          <p:cNvCxnSpPr>
+            <a:cxnSpLocks/>
+            <a:stCxn id="4" idx="3"/>
+            <a:endCxn id="23" idx="2"/>
+          </p:cNvCxnSpPr>
+          <p:nvPr/>
+        </p:nvCxnSpPr>
+        <p:spPr>
+          <a:xfrm>
+            <a:off x="10517703" y="1823579"/>
+            <a:ext cx="374751" cy="7682"/>
+          </a:xfrm>
+          <a:prstGeom prst="straightConnector1">
+            <a:avLst/>
+          </a:prstGeom>
+          <a:ln w="19050">
+            <a:solidFill>
+              <a:schemeClr val="tx1"/>
+            </a:solidFill>
+            <a:tailEnd type="triangle"/>
+          </a:ln>
+        </p:spPr>
+        <p:style>
+          <a:lnRef idx="1">
+            <a:schemeClr val="accent1"/>
+          </a:lnRef>
+          <a:fillRef idx="0">
+            <a:schemeClr val="accent1"/>
+          </a:fillRef>
+          <a:effectRef idx="0">
+            <a:schemeClr val="accent1"/>
+          </a:effectRef>
+          <a:fontRef idx="minor">
+            <a:schemeClr val="tx1"/>
+          </a:fontRef>
+        </p:style>
+      </p:cxnSp>
+      <p:cxnSp>
+        <p:nvCxnSpPr>
+          <p:cNvPr id="61" name="Gerade Verbindung mit Pfeil 60">
+            <a:extLst>
+              <a:ext uri="{FF2B5EF4-FFF2-40B4-BE49-F238E27FC236}">
+                <a16:creationId xmlns:a16="http://schemas.microsoft.com/office/drawing/2014/main" id="{D7C3DC90-C6D0-EE97-88F8-EAE1BF6EFC5F}"/>
+              </a:ext>
+            </a:extLst>
+          </p:cNvPr>
+          <p:cNvCxnSpPr>
+            <a:cxnSpLocks/>
+            <a:stCxn id="23" idx="3"/>
+            <a:endCxn id="5" idx="0"/>
+          </p:cNvCxnSpPr>
+          <p:nvPr/>
+        </p:nvCxnSpPr>
+        <p:spPr>
+          <a:xfrm>
+            <a:off x="11339471" y="2458582"/>
+            <a:ext cx="0" cy="346710"/>
+          </a:xfrm>
+          <a:prstGeom prst="straightConnector1">
+            <a:avLst/>
+          </a:prstGeom>
+          <a:ln w="19050">
+            <a:solidFill>
+              <a:schemeClr val="tx1"/>
+            </a:solidFill>
+            <a:tailEnd type="triangle"/>
+          </a:ln>
+        </p:spPr>
+        <p:style>
+          <a:lnRef idx="1">
+            <a:schemeClr val="accent1"/>
+          </a:lnRef>
+          <a:fillRef idx="0">
+            <a:schemeClr val="accent1"/>
+          </a:fillRef>
+          <a:effectRef idx="0">
+            <a:schemeClr val="accent1"/>
+          </a:effectRef>
+          <a:fontRef idx="minor">
+            <a:schemeClr val="tx1"/>
+          </a:fontRef>
+        </p:style>
+      </p:cxnSp>
+      <p:cxnSp>
+        <p:nvCxnSpPr>
+          <p:cNvPr id="64" name="Gerade Verbindung mit Pfeil 63">
+            <a:extLst>
+              <a:ext uri="{FF2B5EF4-FFF2-40B4-BE49-F238E27FC236}">
+                <a16:creationId xmlns:a16="http://schemas.microsoft.com/office/drawing/2014/main" id="{0BDA153A-84B9-33D8-CF85-810C412ECCF7}"/>
+              </a:ext>
+            </a:extLst>
+          </p:cNvPr>
+          <p:cNvCxnSpPr>
+            <a:cxnSpLocks/>
+            <a:stCxn id="5" idx="2"/>
+            <a:endCxn id="6" idx="0"/>
+          </p:cNvCxnSpPr>
+          <p:nvPr/>
+        </p:nvCxnSpPr>
+        <p:spPr>
+          <a:xfrm flipH="1">
+            <a:off x="11339470" y="3341092"/>
+            <a:ext cx="1" cy="372132"/>
+          </a:xfrm>
+          <a:prstGeom prst="straightConnector1">
+            <a:avLst/>
+          </a:prstGeom>
+          <a:ln w="19050">
+            <a:solidFill>
+              <a:schemeClr val="tx1"/>
+            </a:solidFill>
+            <a:tailEnd type="triangle"/>
+          </a:ln>
+        </p:spPr>
+        <p:style>
+          <a:lnRef idx="1">
+            <a:schemeClr val="accent1"/>
+          </a:lnRef>
+          <a:fillRef idx="0">
+            <a:schemeClr val="accent1"/>
+          </a:fillRef>
+          <a:effectRef idx="0">
+            <a:schemeClr val="accent1"/>
+          </a:effectRef>
+          <a:fontRef idx="minor">
+            <a:schemeClr val="tx1"/>
+          </a:fontRef>
+        </p:style>
+      </p:cxnSp>
+      <p:cxnSp>
+        <p:nvCxnSpPr>
+          <p:cNvPr id="72" name="Gerade Verbindung mit Pfeil 71">
+            <a:extLst>
+              <a:ext uri="{FF2B5EF4-FFF2-40B4-BE49-F238E27FC236}">
+                <a16:creationId xmlns:a16="http://schemas.microsoft.com/office/drawing/2014/main" id="{130FEA6D-DD9C-02EA-7563-A9EB97926643}"/>
+              </a:ext>
+            </a:extLst>
+          </p:cNvPr>
+          <p:cNvCxnSpPr>
+            <a:cxnSpLocks/>
+            <a:stCxn id="19" idx="0"/>
+            <a:endCxn id="17" idx="2"/>
+          </p:cNvCxnSpPr>
+          <p:nvPr/>
+        </p:nvCxnSpPr>
+        <p:spPr>
+          <a:xfrm flipH="1" flipV="1">
+            <a:off x="1014800" y="2250216"/>
+            <a:ext cx="8823" cy="528341"/>
+          </a:xfrm>
+          <a:prstGeom prst="straightConnector1">
+            <a:avLst/>
+          </a:prstGeom>
+          <a:ln w="19050">
+            <a:solidFill>
+              <a:schemeClr val="tx1"/>
+            </a:solidFill>
+            <a:tailEnd type="triangle"/>
+          </a:ln>
+        </p:spPr>
+        <p:style>
+          <a:lnRef idx="1">
+            <a:schemeClr val="accent1"/>
+          </a:lnRef>
+          <a:fillRef idx="0">
+            <a:schemeClr val="accent1"/>
+          </a:fillRef>
+          <a:effectRef idx="0">
+            <a:schemeClr val="accent1"/>
+          </a:effectRef>
+          <a:fontRef idx="minor">
+            <a:schemeClr val="tx1"/>
+          </a:fontRef>
+        </p:style>
+      </p:cxnSp>
+      <p:cxnSp>
+        <p:nvCxnSpPr>
+          <p:cNvPr id="95" name="Gerade Verbindung mit Pfeil 94">
+            <a:extLst>
+              <a:ext uri="{FF2B5EF4-FFF2-40B4-BE49-F238E27FC236}">
+                <a16:creationId xmlns:a16="http://schemas.microsoft.com/office/drawing/2014/main" id="{B6201C93-D512-FF9A-5CC4-BE309C410EB7}"/>
+              </a:ext>
+            </a:extLst>
+          </p:cNvPr>
+          <p:cNvCxnSpPr>
+            <a:cxnSpLocks/>
+            <a:stCxn id="2" idx="0"/>
+            <a:endCxn id="4" idx="2"/>
+          </p:cNvCxnSpPr>
+          <p:nvPr/>
+        </p:nvCxnSpPr>
+        <p:spPr>
+          <a:xfrm flipV="1">
+            <a:off x="9850109" y="2091479"/>
+            <a:ext cx="10148" cy="372355"/>
+          </a:xfrm>
+          <a:prstGeom prst="straightConnector1">
+            <a:avLst/>
+          </a:prstGeom>
+          <a:ln w="19050">
+            <a:solidFill>
+              <a:schemeClr val="tx1"/>
+            </a:solidFill>
+            <a:tailEnd type="triangle"/>
+          </a:ln>
+        </p:spPr>
+        <p:style>
+          <a:lnRef idx="1">
+            <a:schemeClr val="accent1"/>
+          </a:lnRef>
+          <a:fillRef idx="0">
+            <a:schemeClr val="accent1"/>
+          </a:fillRef>
+          <a:effectRef idx="0">
+            <a:schemeClr val="accent1"/>
+          </a:effectRef>
+          <a:fontRef idx="minor">
+            <a:schemeClr val="tx1"/>
+          </a:fontRef>
+        </p:style>
+      </p:cxnSp>
+      <p:sp>
+        <p:nvSpPr>
+          <p:cNvPr id="114" name="Textfeld 113">
+            <a:extLst>
+              <a:ext uri="{FF2B5EF4-FFF2-40B4-BE49-F238E27FC236}">
+                <a16:creationId xmlns:a16="http://schemas.microsoft.com/office/drawing/2014/main" id="{06C21836-7EF0-A60F-A2C0-2E3AF1E86CBD}"/>
+              </a:ext>
+            </a:extLst>
+          </p:cNvPr>
+          <p:cNvSpPr txBox="1"/>
+          <p:nvPr/>
+        </p:nvSpPr>
+        <p:spPr>
+          <a:xfrm>
+            <a:off x="2164453" y="2895521"/>
+            <a:ext cx="2009554" cy="369332"/>
+          </a:xfrm>
+          <a:prstGeom prst="rect">
+            <a:avLst/>
+          </a:prstGeom>
+          <a:noFill/>
+        </p:spPr>
+        <p:txBody>
+          <a:bodyPr wrap="square" rtlCol="0">
+            <a:spAutoFit/>
+          </a:bodyPr>
+          <a:lstStyle/>
+          <a:p>
+            <a:r>
+              <a:rPr lang="de-DE" dirty="0">
+                <a:latin typeface="Arial" panose="020B0604020202020204" pitchFamily="34" charset="0"/>
+                <a:cs typeface="Arial" panose="020B0604020202020204" pitchFamily="34" charset="0"/>
+              </a:rPr>
+              <a:t>Legend: </a:t>
+            </a:r>
+            <a:endParaRPr lang="en-US" dirty="0">
+              <a:latin typeface="Arial" panose="020B0604020202020204" pitchFamily="34" charset="0"/>
+              <a:cs typeface="Arial" panose="020B0604020202020204" pitchFamily="34" charset="0"/>
+            </a:endParaRPr>
+          </a:p>
+        </p:txBody>
+      </p:sp>
+      <p:grpSp>
+        <p:nvGrpSpPr>
+          <p:cNvPr id="134" name="Gruppieren 133">
+            <a:extLst>
+              <a:ext uri="{FF2B5EF4-FFF2-40B4-BE49-F238E27FC236}">
+                <a16:creationId xmlns:a16="http://schemas.microsoft.com/office/drawing/2014/main" id="{D8D4EBAA-52FB-54DD-C5B9-632290BAF239}"/>
+              </a:ext>
+            </a:extLst>
+          </p:cNvPr>
+          <p:cNvGrpSpPr/>
+          <p:nvPr/>
+        </p:nvGrpSpPr>
+        <p:grpSpPr>
+          <a:xfrm>
+            <a:off x="2356867" y="3341092"/>
+            <a:ext cx="3366833" cy="429541"/>
+            <a:chOff x="2502339" y="3725556"/>
+            <a:chExt cx="3366833" cy="429541"/>
+          </a:xfrm>
+        </p:grpSpPr>
+        <p:sp>
+          <p:nvSpPr>
+            <p:cNvPr id="113" name="Rechteck 112">
+              <a:extLst>
+                <a:ext uri="{FF2B5EF4-FFF2-40B4-BE49-F238E27FC236}">
+                  <a16:creationId xmlns:a16="http://schemas.microsoft.com/office/drawing/2014/main" id="{5D258B54-B979-EF06-063A-A1910D10E0CD}"/>
+                </a:ext>
+              </a:extLst>
+            </p:cNvPr>
+            <p:cNvSpPr/>
+            <p:nvPr/>
+          </p:nvSpPr>
+          <p:spPr>
+            <a:xfrm>
+              <a:off x="2502339" y="3732327"/>
+              <a:ext cx="594910" cy="422770"/>
+            </a:xfrm>
+            <a:prstGeom prst="rect">
+              <a:avLst/>
+            </a:prstGeom>
+            <a:noFill/>
+            <a:ln w="19050">
+              <a:solidFill>
+                <a:schemeClr val="tx1"/>
+              </a:solidFill>
+            </a:ln>
+          </p:spPr>
+          <p:style>
+            <a:lnRef idx="2">
+              <a:schemeClr val="accent1">
+                <a:shade val="15000"/>
+              </a:schemeClr>
+            </a:lnRef>
+            <a:fillRef idx="1">
+              <a:schemeClr val="accent1"/>
+            </a:fillRef>
+            <a:effectRef idx="0">
+              <a:schemeClr val="accent1"/>
+            </a:effectRef>
+            <a:fontRef idx="minor">
+              <a:schemeClr val="lt1"/>
+            </a:fontRef>
+          </p:style>
+          <p:txBody>
+            <a:bodyPr rtlCol="0" anchor="ctr"/>
+            <a:lstStyle/>
+            <a:p>
+              <a:pPr algn="ctr"/>
+              <a:endParaRPr lang="en-US" sz="1600" dirty="0">
+                <a:solidFill>
+                  <a:schemeClr val="tx1"/>
+                </a:solidFill>
+                <a:latin typeface="Arial" panose="020B0604020202020204" pitchFamily="34" charset="0"/>
+                <a:cs typeface="Arial" panose="020B0604020202020204" pitchFamily="34" charset="0"/>
+              </a:endParaRPr>
+            </a:p>
+          </p:txBody>
+        </p:sp>
+        <p:sp>
+          <p:nvSpPr>
+            <p:cNvPr id="122" name="Textfeld 121">
+              <a:extLst>
+                <a:ext uri="{FF2B5EF4-FFF2-40B4-BE49-F238E27FC236}">
+                  <a16:creationId xmlns:a16="http://schemas.microsoft.com/office/drawing/2014/main" id="{F388A2F8-2F74-8D36-C58F-FE1EFFBEC8DB}"/>
+                </a:ext>
+              </a:extLst>
+            </p:cNvPr>
+            <p:cNvSpPr txBox="1"/>
+            <p:nvPr/>
+          </p:nvSpPr>
+          <p:spPr>
+            <a:xfrm>
+              <a:off x="3513621" y="3725556"/>
+              <a:ext cx="2355551" cy="369332"/>
+            </a:xfrm>
+            <a:prstGeom prst="rect">
+              <a:avLst/>
+            </a:prstGeom>
+            <a:noFill/>
+          </p:spPr>
+          <p:txBody>
+            <a:bodyPr wrap="square" rtlCol="0">
+              <a:spAutoFit/>
+            </a:bodyPr>
+            <a:lstStyle/>
+            <a:p>
+              <a:r>
+                <a:rPr lang="de-DE" dirty="0">
+                  <a:latin typeface="Arial" panose="020B0604020202020204" pitchFamily="34" charset="0"/>
+                  <a:cs typeface="Arial" panose="020B0604020202020204" pitchFamily="34" charset="0"/>
+                </a:rPr>
+                <a:t>Method </a:t>
+              </a:r>
+              <a:r>
+                <a:rPr lang="de-DE" dirty="0" err="1">
+                  <a:latin typeface="Arial" panose="020B0604020202020204" pitchFamily="34" charset="0"/>
+                  <a:cs typeface="Arial" panose="020B0604020202020204" pitchFamily="34" charset="0"/>
+                </a:rPr>
+                <a:t>used</a:t>
+              </a:r>
+              <a:endParaRPr lang="de-DE" dirty="0">
+                <a:latin typeface="Arial" panose="020B0604020202020204" pitchFamily="34" charset="0"/>
+                <a:cs typeface="Arial" panose="020B0604020202020204" pitchFamily="34" charset="0"/>
+              </a:endParaRPr>
+            </a:p>
+          </p:txBody>
+        </p:sp>
+      </p:grpSp>
+      <p:grpSp>
+        <p:nvGrpSpPr>
+          <p:cNvPr id="129" name="Gruppieren 128">
+            <a:extLst>
+              <a:ext uri="{FF2B5EF4-FFF2-40B4-BE49-F238E27FC236}">
+                <a16:creationId xmlns:a16="http://schemas.microsoft.com/office/drawing/2014/main" id="{AA0B41E4-C19B-F4F4-C59B-B62229E77BA4}"/>
+              </a:ext>
+            </a:extLst>
+          </p:cNvPr>
+          <p:cNvGrpSpPr/>
+          <p:nvPr/>
+        </p:nvGrpSpPr>
+        <p:grpSpPr>
+          <a:xfrm>
+            <a:off x="5814198" y="3812700"/>
+            <a:ext cx="2714162" cy="586800"/>
+            <a:chOff x="5959670" y="4197164"/>
+            <a:chExt cx="2714162" cy="586800"/>
+          </a:xfrm>
+        </p:grpSpPr>
+        <p:sp>
+          <p:nvSpPr>
+            <p:cNvPr id="125" name="Flussdiagramm: Dokument 124">
+              <a:extLst>
+                <a:ext uri="{FF2B5EF4-FFF2-40B4-BE49-F238E27FC236}">
+                  <a16:creationId xmlns:a16="http://schemas.microsoft.com/office/drawing/2014/main" id="{50A7B006-75A3-0C90-BA5D-58E55F0D33BC}"/>
+                </a:ext>
+              </a:extLst>
+            </p:cNvPr>
+            <p:cNvSpPr/>
+            <p:nvPr/>
+          </p:nvSpPr>
+          <p:spPr>
+            <a:xfrm>
+              <a:off x="5959670" y="4197164"/>
+              <a:ext cx="597600" cy="586800"/>
+            </a:xfrm>
+            <a:prstGeom prst="flowChartDocument">
+              <a:avLst/>
+            </a:prstGeom>
+            <a:noFill/>
+            <a:ln w="38100"/>
+          </p:spPr>
+          <p:style>
+            <a:lnRef idx="2">
+              <a:schemeClr val="accent1">
+                <a:shade val="15000"/>
+              </a:schemeClr>
+            </a:lnRef>
+            <a:fillRef idx="1">
+              <a:schemeClr val="accent1"/>
+            </a:fillRef>
+            <a:effectRef idx="0">
+              <a:schemeClr val="accent1"/>
+            </a:effectRef>
+            <a:fontRef idx="minor">
+              <a:schemeClr val="lt1"/>
+            </a:fontRef>
+          </p:style>
+          <p:txBody>
+            <a:bodyPr rtlCol="0" anchor="ctr"/>
+            <a:lstStyle/>
+            <a:p>
+              <a:pPr algn="ctr"/>
+              <a:endParaRPr lang="en-US" sz="1600" b="1" dirty="0">
+                <a:solidFill>
+                  <a:schemeClr val="tx1"/>
+                </a:solidFill>
+                <a:latin typeface="Arial" panose="020B0604020202020204" pitchFamily="34" charset="0"/>
+                <a:cs typeface="Arial" panose="020B0604020202020204" pitchFamily="34" charset="0"/>
+              </a:endParaRPr>
+            </a:p>
+          </p:txBody>
+        </p:sp>
+        <p:sp>
+          <p:nvSpPr>
+            <p:cNvPr id="126" name="Textfeld 125">
+              <a:extLst>
+                <a:ext uri="{FF2B5EF4-FFF2-40B4-BE49-F238E27FC236}">
+                  <a16:creationId xmlns:a16="http://schemas.microsoft.com/office/drawing/2014/main" id="{98CD22FE-EF47-412F-4888-741417D5E6A9}"/>
+                </a:ext>
+              </a:extLst>
+            </p:cNvPr>
+            <p:cNvSpPr txBox="1"/>
+            <p:nvPr/>
+          </p:nvSpPr>
+          <p:spPr>
+            <a:xfrm>
+              <a:off x="6664278" y="4231999"/>
+              <a:ext cx="2009554" cy="369332"/>
+            </a:xfrm>
+            <a:prstGeom prst="rect">
+              <a:avLst/>
+            </a:prstGeom>
+            <a:noFill/>
+          </p:spPr>
+          <p:txBody>
+            <a:bodyPr wrap="square" rtlCol="0">
+              <a:spAutoFit/>
+            </a:bodyPr>
+            <a:lstStyle/>
+            <a:p>
+              <a:r>
+                <a:rPr lang="de-DE" dirty="0">
+                  <a:latin typeface="Arial" panose="020B0604020202020204" pitchFamily="34" charset="0"/>
+                  <a:cs typeface="Arial" panose="020B0604020202020204" pitchFamily="34" charset="0"/>
+                </a:rPr>
+                <a:t>End </a:t>
+              </a:r>
+              <a:r>
+                <a:rPr lang="de-DE" dirty="0" err="1">
+                  <a:latin typeface="Arial" panose="020B0604020202020204" pitchFamily="34" charset="0"/>
+                  <a:cs typeface="Arial" panose="020B0604020202020204" pitchFamily="34" charset="0"/>
+                </a:rPr>
+                <a:t>result</a:t>
+              </a:r>
+              <a:endParaRPr lang="en-US" dirty="0">
+                <a:latin typeface="Arial" panose="020B0604020202020204" pitchFamily="34" charset="0"/>
+                <a:cs typeface="Arial" panose="020B0604020202020204" pitchFamily="34" charset="0"/>
+              </a:endParaRPr>
+            </a:p>
+          </p:txBody>
+        </p:sp>
+      </p:grpSp>
+      <p:grpSp>
+        <p:nvGrpSpPr>
+          <p:cNvPr id="133" name="Gruppieren 132">
+            <a:extLst>
+              <a:ext uri="{FF2B5EF4-FFF2-40B4-BE49-F238E27FC236}">
+                <a16:creationId xmlns:a16="http://schemas.microsoft.com/office/drawing/2014/main" id="{B6AAE030-7569-7DF6-ABA4-EB50379FC5EA}"/>
+              </a:ext>
+            </a:extLst>
+          </p:cNvPr>
+          <p:cNvGrpSpPr/>
+          <p:nvPr/>
+        </p:nvGrpSpPr>
+        <p:grpSpPr>
+          <a:xfrm>
+            <a:off x="5814160" y="4675002"/>
+            <a:ext cx="6828998" cy="585728"/>
+            <a:chOff x="5959632" y="5059466"/>
+            <a:chExt cx="6828998" cy="585728"/>
+          </a:xfrm>
+        </p:grpSpPr>
+        <p:sp>
+          <p:nvSpPr>
+            <p:cNvPr id="116" name="Flussdiagramm: Dokument 115">
+              <a:extLst>
+                <a:ext uri="{FF2B5EF4-FFF2-40B4-BE49-F238E27FC236}">
+                  <a16:creationId xmlns:a16="http://schemas.microsoft.com/office/drawing/2014/main" id="{90909E9A-44E9-06BF-4815-0BB1D5FC2762}"/>
+                </a:ext>
+              </a:extLst>
+            </p:cNvPr>
+            <p:cNvSpPr/>
+            <p:nvPr/>
+          </p:nvSpPr>
+          <p:spPr>
+            <a:xfrm>
+              <a:off x="5959632" y="5059466"/>
+              <a:ext cx="597638" cy="585728"/>
+            </a:xfrm>
+            <a:prstGeom prst="flowChartDocument">
+              <a:avLst/>
+            </a:prstGeom>
+            <a:noFill/>
+            <a:ln w="19050"/>
+          </p:spPr>
+          <p:style>
+            <a:lnRef idx="2">
+              <a:schemeClr val="accent1">
+                <a:shade val="15000"/>
+              </a:schemeClr>
+            </a:lnRef>
+            <a:fillRef idx="1">
+              <a:schemeClr val="accent1"/>
+            </a:fillRef>
+            <a:effectRef idx="0">
+              <a:schemeClr val="accent1"/>
+            </a:effectRef>
+            <a:fontRef idx="minor">
+              <a:schemeClr val="lt1"/>
+            </a:fontRef>
+          </p:style>
+          <p:txBody>
+            <a:bodyPr rtlCol="0" anchor="ctr"/>
+            <a:lstStyle/>
+            <a:p>
+              <a:pPr algn="ctr"/>
+              <a:endParaRPr lang="en-US" sz="1600" dirty="0">
+                <a:solidFill>
+                  <a:schemeClr val="tx1"/>
+                </a:solidFill>
+                <a:latin typeface="Arial" panose="020B0604020202020204" pitchFamily="34" charset="0"/>
+                <a:cs typeface="Arial" panose="020B0604020202020204" pitchFamily="34" charset="0"/>
+              </a:endParaRPr>
+            </a:p>
+          </p:txBody>
+        </p:sp>
+        <p:sp>
+          <p:nvSpPr>
+            <p:cNvPr id="128" name="Textfeld 127">
+              <a:extLst>
+                <a:ext uri="{FF2B5EF4-FFF2-40B4-BE49-F238E27FC236}">
+                  <a16:creationId xmlns:a16="http://schemas.microsoft.com/office/drawing/2014/main" id="{8060A011-8EE8-0816-75DF-76F53501AFE5}"/>
+                </a:ext>
+              </a:extLst>
+            </p:cNvPr>
+            <p:cNvSpPr txBox="1"/>
+            <p:nvPr/>
+          </p:nvSpPr>
+          <p:spPr>
+            <a:xfrm>
+              <a:off x="6664278" y="5123838"/>
+              <a:ext cx="6124352" cy="369332"/>
+            </a:xfrm>
+            <a:prstGeom prst="rect">
+              <a:avLst/>
+            </a:prstGeom>
+            <a:noFill/>
+          </p:spPr>
+          <p:txBody>
+            <a:bodyPr wrap="square">
+              <a:spAutoFit/>
+            </a:bodyPr>
+            <a:lstStyle/>
+            <a:p>
+              <a:r>
+                <a:rPr lang="en-US" dirty="0">
+                  <a:latin typeface="Arial" panose="020B0604020202020204" pitchFamily="34" charset="0"/>
+                  <a:cs typeface="Arial" panose="020B0604020202020204" pitchFamily="34" charset="0"/>
+                </a:rPr>
+                <a:t>Intermediary result</a:t>
+              </a:r>
+            </a:p>
+          </p:txBody>
+        </p:sp>
+      </p:grpSp>
+      <p:grpSp>
+        <p:nvGrpSpPr>
+          <p:cNvPr id="136" name="Gruppieren 135">
+            <a:extLst>
+              <a:ext uri="{FF2B5EF4-FFF2-40B4-BE49-F238E27FC236}">
+                <a16:creationId xmlns:a16="http://schemas.microsoft.com/office/drawing/2014/main" id="{EB67996B-6D6F-E9D6-FDB3-EDDDF60CC8D0}"/>
+              </a:ext>
+            </a:extLst>
+          </p:cNvPr>
+          <p:cNvGrpSpPr/>
+          <p:nvPr/>
+        </p:nvGrpSpPr>
+        <p:grpSpPr>
+          <a:xfrm>
+            <a:off x="2356867" y="4221462"/>
+            <a:ext cx="3031676" cy="585728"/>
+            <a:chOff x="2502339" y="4308467"/>
+            <a:chExt cx="3031676" cy="585728"/>
+          </a:xfrm>
+        </p:grpSpPr>
+        <p:sp>
+          <p:nvSpPr>
+            <p:cNvPr id="115" name="Flussdiagramm: Mehrere Dokumente 114">
+              <a:extLst>
+                <a:ext uri="{FF2B5EF4-FFF2-40B4-BE49-F238E27FC236}">
+                  <a16:creationId xmlns:a16="http://schemas.microsoft.com/office/drawing/2014/main" id="{0E78DDEC-FE92-5592-F285-9443BDB73595}"/>
+                </a:ext>
+              </a:extLst>
+            </p:cNvPr>
+            <p:cNvSpPr/>
+            <p:nvPr/>
+          </p:nvSpPr>
+          <p:spPr>
+            <a:xfrm>
+              <a:off x="2502339" y="4308467"/>
+              <a:ext cx="596468" cy="585728"/>
+            </a:xfrm>
+            <a:prstGeom prst="flowChartMultidocument">
+              <a:avLst/>
+            </a:prstGeom>
+            <a:noFill/>
+            <a:ln w="19050"/>
+          </p:spPr>
+          <p:style>
+            <a:lnRef idx="2">
+              <a:schemeClr val="accent1">
+                <a:shade val="15000"/>
+              </a:schemeClr>
+            </a:lnRef>
+            <a:fillRef idx="1">
+              <a:schemeClr val="accent1"/>
+            </a:fillRef>
+            <a:effectRef idx="0">
+              <a:schemeClr val="accent1"/>
+            </a:effectRef>
+            <a:fontRef idx="minor">
+              <a:schemeClr val="lt1"/>
+            </a:fontRef>
+          </p:style>
+          <p:txBody>
+            <a:bodyPr rtlCol="0" anchor="ctr"/>
+            <a:lstStyle/>
+            <a:p>
+              <a:pPr algn="ctr"/>
+              <a:endParaRPr lang="en-US" sz="1600" dirty="0">
+                <a:solidFill>
+                  <a:schemeClr val="tx1"/>
+                </a:solidFill>
+                <a:latin typeface="Arial" panose="020B0604020202020204" pitchFamily="34" charset="0"/>
+                <a:cs typeface="Arial" panose="020B0604020202020204" pitchFamily="34" charset="0"/>
+              </a:endParaRPr>
+            </a:p>
+          </p:txBody>
+        </p:sp>
+        <p:sp>
+          <p:nvSpPr>
+            <p:cNvPr id="135" name="Textfeld 134">
+              <a:extLst>
+                <a:ext uri="{FF2B5EF4-FFF2-40B4-BE49-F238E27FC236}">
+                  <a16:creationId xmlns:a16="http://schemas.microsoft.com/office/drawing/2014/main" id="{138105DA-8435-BC00-4E85-44B9EA51D2AA}"/>
+                </a:ext>
+              </a:extLst>
+            </p:cNvPr>
+            <p:cNvSpPr txBox="1"/>
+            <p:nvPr/>
+          </p:nvSpPr>
+          <p:spPr>
+            <a:xfrm>
+              <a:off x="3524461" y="4355363"/>
+              <a:ext cx="2009554" cy="369332"/>
+            </a:xfrm>
+            <a:prstGeom prst="rect">
+              <a:avLst/>
+            </a:prstGeom>
+            <a:noFill/>
+          </p:spPr>
+          <p:txBody>
+            <a:bodyPr wrap="square" rtlCol="0">
+              <a:spAutoFit/>
+            </a:bodyPr>
+            <a:lstStyle/>
+            <a:p>
+              <a:r>
+                <a:rPr lang="de-DE" dirty="0">
+                  <a:latin typeface="Arial" panose="020B0604020202020204" pitchFamily="34" charset="0"/>
+                  <a:cs typeface="Arial" panose="020B0604020202020204" pitchFamily="34" charset="0"/>
+                </a:rPr>
+                <a:t>External </a:t>
+              </a:r>
+              <a:r>
+                <a:rPr lang="de-DE" dirty="0" err="1">
+                  <a:latin typeface="Arial" panose="020B0604020202020204" pitchFamily="34" charset="0"/>
+                  <a:cs typeface="Arial" panose="020B0604020202020204" pitchFamily="34" charset="0"/>
+                </a:rPr>
+                <a:t>data</a:t>
+              </a:r>
+              <a:endParaRPr lang="en-US" dirty="0">
+                <a:latin typeface="Arial" panose="020B0604020202020204" pitchFamily="34" charset="0"/>
+                <a:cs typeface="Arial" panose="020B0604020202020204" pitchFamily="34" charset="0"/>
+              </a:endParaRPr>
+            </a:p>
+          </p:txBody>
+        </p:sp>
+      </p:grpSp>
+      <p:grpSp>
+        <p:nvGrpSpPr>
+          <p:cNvPr id="138" name="Gruppieren 137">
+            <a:extLst>
+              <a:ext uri="{FF2B5EF4-FFF2-40B4-BE49-F238E27FC236}">
+                <a16:creationId xmlns:a16="http://schemas.microsoft.com/office/drawing/2014/main" id="{B2D996F1-81B9-8F59-AEA6-7D5CBB511481}"/>
+              </a:ext>
+            </a:extLst>
+          </p:cNvPr>
+          <p:cNvGrpSpPr/>
+          <p:nvPr/>
+        </p:nvGrpSpPr>
+        <p:grpSpPr>
+          <a:xfrm>
+            <a:off x="2356867" y="5162457"/>
+            <a:ext cx="3020836" cy="585729"/>
+            <a:chOff x="2502339" y="5260480"/>
+            <a:chExt cx="3020836" cy="585729"/>
+          </a:xfrm>
+        </p:grpSpPr>
+        <p:sp>
+          <p:nvSpPr>
+            <p:cNvPr id="117" name="Zylinder 116">
+              <a:extLst>
+                <a:ext uri="{FF2B5EF4-FFF2-40B4-BE49-F238E27FC236}">
+                  <a16:creationId xmlns:a16="http://schemas.microsoft.com/office/drawing/2014/main" id="{B1622538-561E-7A97-0FE9-42A584BA7035}"/>
+                </a:ext>
+              </a:extLst>
+            </p:cNvPr>
+            <p:cNvSpPr/>
+            <p:nvPr/>
+          </p:nvSpPr>
+          <p:spPr>
+            <a:xfrm>
+              <a:off x="2502339" y="5260480"/>
+              <a:ext cx="594909" cy="585729"/>
+            </a:xfrm>
+            <a:prstGeom prst="can">
+              <a:avLst/>
+            </a:prstGeom>
+            <a:noFill/>
+            <a:ln w="19050"/>
+          </p:spPr>
+          <p:style>
+            <a:lnRef idx="2">
+              <a:schemeClr val="accent1">
+                <a:shade val="15000"/>
+              </a:schemeClr>
+            </a:lnRef>
+            <a:fillRef idx="1">
+              <a:schemeClr val="accent1"/>
+            </a:fillRef>
+            <a:effectRef idx="0">
+              <a:schemeClr val="accent1"/>
+            </a:effectRef>
+            <a:fontRef idx="minor">
+              <a:schemeClr val="lt1"/>
+            </a:fontRef>
+          </p:style>
+          <p:txBody>
+            <a:bodyPr rtlCol="0" anchor="ctr"/>
+            <a:lstStyle/>
+            <a:p>
+              <a:pPr algn="ctr"/>
+              <a:endParaRPr lang="en-US" sz="1600" dirty="0">
+                <a:solidFill>
+                  <a:schemeClr val="tx1"/>
+                </a:solidFill>
+                <a:latin typeface="Arial" panose="020B0604020202020204" pitchFamily="34" charset="0"/>
+                <a:cs typeface="Arial" panose="020B0604020202020204" pitchFamily="34" charset="0"/>
+              </a:endParaRPr>
+            </a:p>
+          </p:txBody>
+        </p:sp>
+        <p:sp>
+          <p:nvSpPr>
+            <p:cNvPr id="137" name="Textfeld 136">
+              <a:extLst>
+                <a:ext uri="{FF2B5EF4-FFF2-40B4-BE49-F238E27FC236}">
+                  <a16:creationId xmlns:a16="http://schemas.microsoft.com/office/drawing/2014/main" id="{431F3E12-C3F6-02C4-4009-E5C4F9B7D4FA}"/>
+                </a:ext>
+              </a:extLst>
+            </p:cNvPr>
+            <p:cNvSpPr txBox="1"/>
+            <p:nvPr/>
+          </p:nvSpPr>
+          <p:spPr>
+            <a:xfrm>
+              <a:off x="3513621" y="5368678"/>
+              <a:ext cx="2009554" cy="369332"/>
+            </a:xfrm>
+            <a:prstGeom prst="rect">
+              <a:avLst/>
+            </a:prstGeom>
+            <a:noFill/>
+          </p:spPr>
+          <p:txBody>
+            <a:bodyPr wrap="square" rtlCol="0">
+              <a:spAutoFit/>
+            </a:bodyPr>
+            <a:lstStyle/>
+            <a:p>
+              <a:r>
+                <a:rPr lang="de-DE" dirty="0">
+                  <a:latin typeface="Arial" panose="020B0604020202020204" pitchFamily="34" charset="0"/>
+                  <a:cs typeface="Arial" panose="020B0604020202020204" pitchFamily="34" charset="0"/>
+                </a:rPr>
+                <a:t>Dataset</a:t>
+              </a:r>
+              <a:endParaRPr lang="en-US" dirty="0">
+                <a:latin typeface="Arial" panose="020B0604020202020204" pitchFamily="34" charset="0"/>
+                <a:cs typeface="Arial" panose="020B0604020202020204" pitchFamily="34" charset="0"/>
+              </a:endParaRPr>
+            </a:p>
+          </p:txBody>
+        </p:sp>
+      </p:grpSp>
+      <p:sp>
+        <p:nvSpPr>
+          <p:cNvPr id="9" name="Flussdiagramm: Dokument 5">
+            <a:extLst>
+              <a:ext uri="{FF2B5EF4-FFF2-40B4-BE49-F238E27FC236}">
+                <a16:creationId xmlns:a16="http://schemas.microsoft.com/office/drawing/2014/main" id="{65686A21-19B8-C704-7A87-7AB10B1C4B92}"/>
+              </a:ext>
+            </a:extLst>
+          </p:cNvPr>
+          <p:cNvSpPr/>
+          <p:nvPr/>
+        </p:nvSpPr>
+        <p:spPr>
+          <a:xfrm>
+            <a:off x="10599863" y="5881461"/>
+            <a:ext cx="1479214" cy="1254642"/>
+          </a:xfrm>
+          <a:prstGeom prst="flowChartDocument">
+            <a:avLst/>
+          </a:prstGeom>
+          <a:noFill/>
+          <a:ln w="38100"/>
+        </p:spPr>
+        <p:style>
+          <a:lnRef idx="2">
+            <a:schemeClr val="accent1">
+              <a:shade val="15000"/>
+            </a:schemeClr>
+          </a:lnRef>
+          <a:fillRef idx="1">
+            <a:schemeClr val="accent1"/>
+          </a:fillRef>
+          <a:effectRef idx="0">
+            <a:schemeClr val="accent1"/>
+          </a:effectRef>
+          <a:fontRef idx="minor">
+            <a:schemeClr val="lt1"/>
+          </a:fontRef>
+        </p:style>
+        <p:txBody>
+          <a:bodyPr rtlCol="0" anchor="ctr"/>
+          <a:lstStyle/>
+          <a:p>
+            <a:pPr algn="ctr"/>
+            <a:r>
+              <a:rPr lang="en-US" sz="1600" b="1" dirty="0">
+                <a:solidFill>
+                  <a:schemeClr val="tx1"/>
+                </a:solidFill>
+                <a:latin typeface="Arial" panose="020B0604020202020204" pitchFamily="34" charset="0"/>
+                <a:cs typeface="Arial" panose="020B0604020202020204" pitchFamily="34" charset="0"/>
+              </a:rPr>
+              <a:t>Important textual features</a:t>
+            </a:r>
+          </a:p>
+        </p:txBody>
+      </p:sp>
+      <p:sp>
+        <p:nvSpPr>
+          <p:cNvPr id="10" name="Rechteck 4">
+            <a:extLst>
+              <a:ext uri="{FF2B5EF4-FFF2-40B4-BE49-F238E27FC236}">
+                <a16:creationId xmlns:a16="http://schemas.microsoft.com/office/drawing/2014/main" id="{98074119-8452-239E-AEAE-BA9C909ACC1B}"/>
+              </a:ext>
+            </a:extLst>
+          </p:cNvPr>
+          <p:cNvSpPr/>
+          <p:nvPr/>
+        </p:nvSpPr>
+        <p:spPr>
+          <a:xfrm>
+            <a:off x="10682024" y="5106477"/>
+            <a:ext cx="1314893" cy="535800"/>
+          </a:xfrm>
+          <a:prstGeom prst="rect">
+            <a:avLst/>
+          </a:prstGeom>
+          <a:noFill/>
+          <a:ln w="19050">
+            <a:solidFill>
+              <a:schemeClr val="tx1"/>
+            </a:solidFill>
+          </a:ln>
+        </p:spPr>
+        <p:style>
+          <a:lnRef idx="2">
+            <a:schemeClr val="accent1">
+              <a:shade val="15000"/>
+            </a:schemeClr>
+          </a:lnRef>
+          <a:fillRef idx="1">
+            <a:schemeClr val="accent1"/>
+          </a:fillRef>
+          <a:effectRef idx="0">
+            <a:schemeClr val="accent1"/>
+          </a:effectRef>
+          <a:fontRef idx="minor">
+            <a:schemeClr val="lt1"/>
+          </a:fontRef>
+        </p:style>
+        <p:txBody>
+          <a:bodyPr rtlCol="0" anchor="ctr"/>
+          <a:lstStyle/>
+          <a:p>
+            <a:pPr algn="ctr"/>
+            <a:r>
+              <a:rPr lang="de-DE" sz="1400" dirty="0">
+                <a:solidFill>
+                  <a:schemeClr val="tx1"/>
+                </a:solidFill>
+                <a:latin typeface="Arial" panose="020B0604020202020204" pitchFamily="34" charset="0"/>
+                <a:cs typeface="Arial" panose="020B0604020202020204" pitchFamily="34" charset="0"/>
+              </a:rPr>
+              <a:t>XAI </a:t>
+            </a:r>
+            <a:endParaRPr lang="en-US" sz="1400" dirty="0">
+              <a:solidFill>
+                <a:schemeClr val="tx1"/>
+              </a:solidFill>
+              <a:latin typeface="Arial" panose="020B0604020202020204" pitchFamily="34" charset="0"/>
+              <a:cs typeface="Arial" panose="020B0604020202020204" pitchFamily="34" charset="0"/>
+            </a:endParaRPr>
+          </a:p>
+        </p:txBody>
+      </p:sp>
+      <p:cxnSp>
+        <p:nvCxnSpPr>
+          <p:cNvPr id="11" name="Gerade Verbindung mit Pfeil 60">
+            <a:extLst>
+              <a:ext uri="{FF2B5EF4-FFF2-40B4-BE49-F238E27FC236}">
+                <a16:creationId xmlns:a16="http://schemas.microsoft.com/office/drawing/2014/main" id="{6FB4C4F1-EBB0-F09E-3C5B-54A900AD0E9D}"/>
+              </a:ext>
+            </a:extLst>
+          </p:cNvPr>
+          <p:cNvCxnSpPr>
+            <a:cxnSpLocks/>
+            <a:endCxn id="10" idx="0"/>
+          </p:cNvCxnSpPr>
+          <p:nvPr/>
+        </p:nvCxnSpPr>
+        <p:spPr>
+          <a:xfrm>
+            <a:off x="11339470" y="4924040"/>
+            <a:ext cx="1" cy="182437"/>
+          </a:xfrm>
+          <a:prstGeom prst="straightConnector1">
+            <a:avLst/>
+          </a:prstGeom>
+          <a:ln w="19050">
+            <a:solidFill>
+              <a:schemeClr val="tx1"/>
+            </a:solidFill>
+            <a:tailEnd type="triangle"/>
+          </a:ln>
+        </p:spPr>
+        <p:style>
+          <a:lnRef idx="1">
+            <a:schemeClr val="accent1"/>
+          </a:lnRef>
+          <a:fillRef idx="0">
+            <a:schemeClr val="accent1"/>
+          </a:fillRef>
+          <a:effectRef idx="0">
+            <a:schemeClr val="accent1"/>
+          </a:effectRef>
+          <a:fontRef idx="minor">
+            <a:schemeClr val="tx1"/>
+          </a:fontRef>
+        </p:style>
+      </p:cxnSp>
+      <p:cxnSp>
+        <p:nvCxnSpPr>
+          <p:cNvPr id="14" name="Gerade Verbindung mit Pfeil 60">
+            <a:extLst>
+              <a:ext uri="{FF2B5EF4-FFF2-40B4-BE49-F238E27FC236}">
+                <a16:creationId xmlns:a16="http://schemas.microsoft.com/office/drawing/2014/main" id="{659DF05D-404A-828C-77E8-9F002656BD03}"/>
+              </a:ext>
+            </a:extLst>
+          </p:cNvPr>
+          <p:cNvCxnSpPr>
+            <a:cxnSpLocks/>
+            <a:stCxn id="10" idx="2"/>
+            <a:endCxn id="9" idx="0"/>
+          </p:cNvCxnSpPr>
+          <p:nvPr/>
+        </p:nvCxnSpPr>
+        <p:spPr>
+          <a:xfrm flipH="1">
+            <a:off x="11339470" y="5642277"/>
+            <a:ext cx="1" cy="239184"/>
+          </a:xfrm>
+          <a:prstGeom prst="straightConnector1">
+            <a:avLst/>
+          </a:prstGeom>
+          <a:ln w="19050">
+            <a:solidFill>
+              <a:schemeClr val="tx1"/>
+            </a:solidFill>
+            <a:tailEnd type="triangle"/>
+          </a:ln>
+        </p:spPr>
+        <p:style>
+          <a:lnRef idx="1">
+            <a:schemeClr val="accent1"/>
+          </a:lnRef>
+          <a:fillRef idx="0">
+            <a:schemeClr val="accent1"/>
+          </a:fillRef>
+          <a:effectRef idx="0">
+            <a:schemeClr val="accent1"/>
+          </a:effectRef>
+          <a:fontRef idx="minor">
+            <a:schemeClr val="tx1"/>
+          </a:fontRef>
+        </p:style>
+      </p:cxnSp>
+    </p:spTree>
+    <p:extLst>
+      <p:ext uri="{BB962C8B-B14F-4D97-AF65-F5344CB8AC3E}">
+        <p14:creationId xmlns:p14="http://schemas.microsoft.com/office/powerpoint/2010/main" val="2585779796"/>
+      </p:ext>
+    </p:extLst>
+  </p:cSld>
+  <p:clrMapOvr>
+    <a:masterClrMapping/>
+  </p:clrMapOvr>
+</p:sld>
+</file>
+
+<file path=ppt/slides/slide2.xml><?xml version="1.0" encoding="utf-8"?>
+<p:sld xmlns:a="http://schemas.openxmlformats.org/drawingml/2006/main" xmlns:r="http://schemas.openxmlformats.org/officeDocument/2006/relationships" xmlns:p="http://schemas.openxmlformats.org/presentationml/2006/main">
+  <p:cSld>
+    <p:spTree>
+      <p:nvGrpSpPr>
+        <p:cNvPr id="1" name=""/>
+        <p:cNvGrpSpPr/>
+        <p:nvPr/>
+      </p:nvGrpSpPr>
+      <p:grpSpPr>
+        <a:xfrm>
+          <a:off x="0" y="0"/>
+          <a:ext cx="0" cy="0"/>
+          <a:chOff x="0" y="0"/>
+          <a:chExt cx="0" cy="0"/>
+        </a:xfrm>
+      </p:grpSpPr>
       <p:pic>
         <p:nvPicPr>
           <p:cNvPr id="5" name="Picture 4">
@@ -3381,8 +5990,8 @@
         </p:blipFill>
         <p:spPr>
           <a:xfrm>
-            <a:off x="969731" y="1633104"/>
-            <a:ext cx="3250413" cy="1656000"/>
+            <a:off x="969732" y="1633105"/>
+            <a:ext cx="3250414" cy="1656000"/>
           </a:xfrm>
           <a:prstGeom prst="rect">
             <a:avLst/>
@@ -3411,8 +6020,8 @@
         </p:blipFill>
         <p:spPr>
           <a:xfrm>
-            <a:off x="4371066" y="1633104"/>
-            <a:ext cx="3250413" cy="1656000"/>
+            <a:off x="4371066" y="1633105"/>
+            <a:ext cx="3250414" cy="1656000"/>
           </a:xfrm>
           <a:prstGeom prst="rect">
             <a:avLst/>
@@ -3441,8 +6050,8 @@
         </p:blipFill>
         <p:spPr>
           <a:xfrm>
-            <a:off x="7772401" y="1633104"/>
-            <a:ext cx="3250413" cy="1656000"/>
+            <a:off x="7772402" y="1633105"/>
+            <a:ext cx="3250414" cy="1656000"/>
           </a:xfrm>
           <a:prstGeom prst="rect">
             <a:avLst/>
@@ -3471,8 +6080,8 @@
         </p:blipFill>
         <p:spPr>
           <a:xfrm>
-            <a:off x="969730" y="3289104"/>
-            <a:ext cx="3250413" cy="1656000"/>
+            <a:off x="969731" y="3289105"/>
+            <a:ext cx="3250414" cy="1656000"/>
           </a:xfrm>
           <a:prstGeom prst="rect">
             <a:avLst/>
@@ -3502,7 +6111,7 @@
         <p:spPr>
           <a:xfrm>
             <a:off x="4371067" y="3290534"/>
-            <a:ext cx="3250413" cy="1656000"/>
+            <a:ext cx="3250414" cy="1656000"/>
           </a:xfrm>
           <a:prstGeom prst="rect">
             <a:avLst/>
@@ -3531,7 +6140,7 @@
         </p:blipFill>
         <p:spPr>
           <a:xfrm>
-            <a:off x="7772401" y="3289104"/>
+            <a:off x="7772402" y="3289103"/>
             <a:ext cx="3253220" cy="1657430"/>
           </a:xfrm>
           <a:prstGeom prst="rect">
@@ -3552,7 +6161,7 @@
 </p:sld>
 </file>
 
-<file path=ppt/slides/slide2.xml><?xml version="1.0" encoding="utf-8"?>
+<file path=ppt/slides/slide3.xml><?xml version="1.0" encoding="utf-8"?>
 <p:sld xmlns:a="http://schemas.openxmlformats.org/drawingml/2006/main" xmlns:r="http://schemas.openxmlformats.org/officeDocument/2006/relationships" xmlns:p="http://schemas.openxmlformats.org/presentationml/2006/main">
   <p:cSld>
     <p:bg>
@@ -3604,8 +6213,8 @@
         </p:blipFill>
         <p:spPr>
           <a:xfrm>
-            <a:off x="969249" y="1634400"/>
-            <a:ext cx="3276594" cy="1671928"/>
+            <a:off x="969250" y="1634399"/>
+            <a:ext cx="3276594" cy="1671929"/>
           </a:xfrm>
           <a:prstGeom prst="rect">
             <a:avLst/>
@@ -3639,8 +6248,8 @@
         </p:blipFill>
         <p:spPr>
           <a:xfrm>
-            <a:off x="4370400" y="1636476"/>
-            <a:ext cx="3247059" cy="1651847"/>
+            <a:off x="4370402" y="1636477"/>
+            <a:ext cx="3247058" cy="1651847"/>
           </a:xfrm>
           <a:prstGeom prst="rect">
             <a:avLst/>
@@ -3674,8 +6283,8 @@
         </p:blipFill>
         <p:spPr>
           <a:xfrm>
-            <a:off x="7742008" y="1634400"/>
-            <a:ext cx="3245379" cy="1656000"/>
+            <a:off x="7742009" y="1634401"/>
+            <a:ext cx="3245378" cy="1656000"/>
           </a:xfrm>
           <a:prstGeom prst="rect">
             <a:avLst/>
@@ -3779,8 +6388,8 @@
         </p:blipFill>
         <p:spPr>
           <a:xfrm>
-            <a:off x="7741166" y="3310660"/>
-            <a:ext cx="3247061" cy="1647336"/>
+            <a:off x="7741167" y="3310661"/>
+            <a:ext cx="3247061" cy="1647337"/>
           </a:xfrm>
           <a:prstGeom prst="rect">
             <a:avLst/>

</xml_diff>